<commit_message>
added the presentation ppt slide
</commit_message>
<xml_diff>
--- a/6.ProjectDemo/Mystic.pptx
+++ b/6.ProjectDemo/Mystic.pptx
@@ -5,7 +5,7 @@
     <p:sldMasterId id="2147483648" r:id="rId1"/>
   </p:sldMasterIdLst>
   <p:notesMasterIdLst>
-    <p:notesMasterId r:id="rId13"/>
+    <p:notesMasterId r:id="rId14"/>
   </p:notesMasterIdLst>
   <p:sldIdLst>
     <p:sldId id="268" r:id="rId2"/>
@@ -16,9 +16,10 @@
     <p:sldId id="271" r:id="rId7"/>
     <p:sldId id="272" r:id="rId8"/>
     <p:sldId id="264" r:id="rId9"/>
-    <p:sldId id="267" r:id="rId10"/>
-    <p:sldId id="265" r:id="rId11"/>
-    <p:sldId id="273" r:id="rId12"/>
+    <p:sldId id="273" r:id="rId10"/>
+    <p:sldId id="267" r:id="rId11"/>
+    <p:sldId id="265" r:id="rId12"/>
+    <p:sldId id="274" r:id="rId13"/>
   </p:sldIdLst>
   <p:sldSz cx="12192000" cy="6858000"/>
   <p:notesSz cx="6858000" cy="9144000"/>
@@ -117,6 +118,11 @@
       </a:defRPr>
     </a:lvl9pPr>
   </p:defaultTextStyle>
+  <p:extLst>
+    <p:ext uri="{EFAFB233-063F-42B5-8137-9DF3F51BA10A}">
+      <p15:sldGuideLst xmlns:p15="http://schemas.microsoft.com/office/powerpoint/2012/main"/>
+    </p:ext>
+  </p:extLst>
 </p:presentation>
 </file>
 
@@ -903,6 +909,788 @@
 </file>
 
 <file path=ppt/diagrams/colors2.xml><?xml version="1.0" encoding="utf-8"?>
+<dgm:colorsDef xmlns:dgm="http://schemas.openxmlformats.org/drawingml/2006/diagram" xmlns:a="http://schemas.openxmlformats.org/drawingml/2006/main" uniqueId="urn:microsoft.com/office/officeart/2005/8/colors/colorful2">
+  <dgm:title val=""/>
+  <dgm:desc val=""/>
+  <dgm:catLst>
+    <dgm:cat type="colorful" pri="10200"/>
+  </dgm:catLst>
+  <dgm:styleLbl name="node0">
+    <dgm:fillClrLst meth="repeat">
+      <a:schemeClr val="accent1"/>
+    </dgm:fillClrLst>
+    <dgm:linClrLst meth="repeat">
+      <a:schemeClr val="lt1"/>
+    </dgm:linClrLst>
+    <dgm:effectClrLst/>
+    <dgm:txLinClrLst/>
+    <dgm:txFillClrLst/>
+    <dgm:txEffectClrLst/>
+  </dgm:styleLbl>
+  <dgm:styleLbl name="node1">
+    <dgm:fillClrLst>
+      <a:schemeClr val="accent2"/>
+      <a:schemeClr val="accent3"/>
+    </dgm:fillClrLst>
+    <dgm:linClrLst meth="repeat">
+      <a:schemeClr val="lt1"/>
+    </dgm:linClrLst>
+    <dgm:effectClrLst/>
+    <dgm:txLinClrLst/>
+    <dgm:txFillClrLst/>
+    <dgm:txEffectClrLst/>
+  </dgm:styleLbl>
+  <dgm:styleLbl name="alignNode1">
+    <dgm:fillClrLst>
+      <a:schemeClr val="accent2"/>
+      <a:schemeClr val="accent3"/>
+    </dgm:fillClrLst>
+    <dgm:linClrLst>
+      <a:schemeClr val="accent2"/>
+      <a:schemeClr val="accent3"/>
+    </dgm:linClrLst>
+    <dgm:effectClrLst/>
+    <dgm:txLinClrLst/>
+    <dgm:txFillClrLst/>
+    <dgm:txEffectClrLst/>
+  </dgm:styleLbl>
+  <dgm:styleLbl name="lnNode1">
+    <dgm:fillClrLst>
+      <a:schemeClr val="accent2"/>
+      <a:schemeClr val="accent3"/>
+    </dgm:fillClrLst>
+    <dgm:linClrLst meth="repeat">
+      <a:schemeClr val="lt1"/>
+    </dgm:linClrLst>
+    <dgm:effectClrLst/>
+    <dgm:txLinClrLst/>
+    <dgm:txFillClrLst/>
+    <dgm:txEffectClrLst/>
+  </dgm:styleLbl>
+  <dgm:styleLbl name="vennNode1">
+    <dgm:fillClrLst>
+      <a:schemeClr val="accent2">
+        <a:alpha val="50000"/>
+      </a:schemeClr>
+      <a:schemeClr val="accent3">
+        <a:alpha val="50000"/>
+      </a:schemeClr>
+    </dgm:fillClrLst>
+    <dgm:linClrLst meth="repeat">
+      <a:schemeClr val="lt1"/>
+    </dgm:linClrLst>
+    <dgm:effectClrLst/>
+    <dgm:txLinClrLst/>
+    <dgm:txFillClrLst/>
+    <dgm:txEffectClrLst/>
+  </dgm:styleLbl>
+  <dgm:styleLbl name="node2">
+    <dgm:fillClrLst>
+      <a:schemeClr val="accent3"/>
+    </dgm:fillClrLst>
+    <dgm:linClrLst meth="repeat">
+      <a:schemeClr val="lt1"/>
+    </dgm:linClrLst>
+    <dgm:effectClrLst/>
+    <dgm:txLinClrLst/>
+    <dgm:txFillClrLst/>
+    <dgm:txEffectClrLst/>
+  </dgm:styleLbl>
+  <dgm:styleLbl name="node3">
+    <dgm:fillClrLst>
+      <a:schemeClr val="accent4"/>
+    </dgm:fillClrLst>
+    <dgm:linClrLst meth="repeat">
+      <a:schemeClr val="lt1"/>
+    </dgm:linClrLst>
+    <dgm:effectClrLst/>
+    <dgm:txLinClrLst/>
+    <dgm:txFillClrLst/>
+    <dgm:txEffectClrLst/>
+  </dgm:styleLbl>
+  <dgm:styleLbl name="node4">
+    <dgm:fillClrLst>
+      <a:schemeClr val="accent5"/>
+    </dgm:fillClrLst>
+    <dgm:linClrLst meth="repeat">
+      <a:schemeClr val="lt1"/>
+    </dgm:linClrLst>
+    <dgm:effectClrLst/>
+    <dgm:txLinClrLst/>
+    <dgm:txFillClrLst/>
+    <dgm:txEffectClrLst/>
+  </dgm:styleLbl>
+  <dgm:styleLbl name="fgImgPlace1">
+    <dgm:fillClrLst>
+      <a:schemeClr val="accent2">
+        <a:tint val="50000"/>
+      </a:schemeClr>
+      <a:schemeClr val="accent3">
+        <a:tint val="50000"/>
+      </a:schemeClr>
+    </dgm:fillClrLst>
+    <dgm:linClrLst meth="repeat">
+      <a:schemeClr val="lt1"/>
+    </dgm:linClrLst>
+    <dgm:effectClrLst/>
+    <dgm:txLinClrLst/>
+    <dgm:txFillClrLst meth="repeat">
+      <a:schemeClr val="lt1"/>
+    </dgm:txFillClrLst>
+    <dgm:txEffectClrLst/>
+  </dgm:styleLbl>
+  <dgm:styleLbl name="alignImgPlace1">
+    <dgm:fillClrLst>
+      <a:schemeClr val="accent2">
+        <a:tint val="50000"/>
+      </a:schemeClr>
+      <a:schemeClr val="accent3">
+        <a:tint val="20000"/>
+      </a:schemeClr>
+    </dgm:fillClrLst>
+    <dgm:linClrLst meth="repeat">
+      <a:schemeClr val="lt1"/>
+    </dgm:linClrLst>
+    <dgm:effectClrLst/>
+    <dgm:txLinClrLst/>
+    <dgm:txFillClrLst meth="repeat">
+      <a:schemeClr val="lt1"/>
+    </dgm:txFillClrLst>
+    <dgm:txEffectClrLst/>
+  </dgm:styleLbl>
+  <dgm:styleLbl name="bgImgPlace1">
+    <dgm:fillClrLst>
+      <a:schemeClr val="accent2">
+        <a:tint val="50000"/>
+      </a:schemeClr>
+      <a:schemeClr val="accent3">
+        <a:tint val="20000"/>
+      </a:schemeClr>
+    </dgm:fillClrLst>
+    <dgm:linClrLst meth="repeat">
+      <a:schemeClr val="lt1"/>
+    </dgm:linClrLst>
+    <dgm:effectClrLst/>
+    <dgm:txLinClrLst/>
+    <dgm:txFillClrLst meth="repeat">
+      <a:schemeClr val="lt1"/>
+    </dgm:txFillClrLst>
+    <dgm:txEffectClrLst/>
+  </dgm:styleLbl>
+  <dgm:styleLbl name="sibTrans2D1">
+    <dgm:fillClrLst>
+      <a:schemeClr val="accent2"/>
+      <a:schemeClr val="accent3"/>
+    </dgm:fillClrLst>
+    <dgm:linClrLst meth="repeat">
+      <a:schemeClr val="lt1"/>
+    </dgm:linClrLst>
+    <dgm:effectClrLst/>
+    <dgm:txLinClrLst/>
+    <dgm:txFillClrLst/>
+    <dgm:txEffectClrLst/>
+  </dgm:styleLbl>
+  <dgm:styleLbl name="fgSibTrans2D1">
+    <dgm:fillClrLst>
+      <a:schemeClr val="accent2"/>
+      <a:schemeClr val="accent3"/>
+    </dgm:fillClrLst>
+    <dgm:linClrLst meth="repeat">
+      <a:schemeClr val="lt1"/>
+    </dgm:linClrLst>
+    <dgm:effectClrLst/>
+    <dgm:txLinClrLst/>
+    <dgm:txFillClrLst meth="repeat">
+      <a:schemeClr val="lt1"/>
+    </dgm:txFillClrLst>
+    <dgm:txEffectClrLst/>
+  </dgm:styleLbl>
+  <dgm:styleLbl name="bgSibTrans2D1">
+    <dgm:fillClrLst>
+      <a:schemeClr val="accent2"/>
+      <a:schemeClr val="accent3"/>
+    </dgm:fillClrLst>
+    <dgm:linClrLst meth="repeat">
+      <a:schemeClr val="lt1"/>
+    </dgm:linClrLst>
+    <dgm:effectClrLst/>
+    <dgm:txLinClrLst/>
+    <dgm:txFillClrLst meth="repeat">
+      <a:schemeClr val="lt1"/>
+    </dgm:txFillClrLst>
+    <dgm:txEffectClrLst/>
+  </dgm:styleLbl>
+  <dgm:styleLbl name="sibTrans1D1">
+    <dgm:fillClrLst/>
+    <dgm:linClrLst>
+      <a:schemeClr val="accent2"/>
+      <a:schemeClr val="accent3"/>
+    </dgm:linClrLst>
+    <dgm:effectClrLst/>
+    <dgm:txLinClrLst/>
+    <dgm:txFillClrLst meth="repeat">
+      <a:schemeClr val="tx1"/>
+    </dgm:txFillClrLst>
+    <dgm:txEffectClrLst/>
+  </dgm:styleLbl>
+  <dgm:styleLbl name="callout">
+    <dgm:fillClrLst meth="repeat">
+      <a:schemeClr val="accent2"/>
+    </dgm:fillClrLst>
+    <dgm:linClrLst meth="repeat">
+      <a:schemeClr val="accent2">
+        <a:tint val="50000"/>
+      </a:schemeClr>
+    </dgm:linClrLst>
+    <dgm:effectClrLst/>
+    <dgm:txLinClrLst/>
+    <dgm:txFillClrLst meth="repeat">
+      <a:schemeClr val="tx1"/>
+    </dgm:txFillClrLst>
+    <dgm:txEffectClrLst/>
+  </dgm:styleLbl>
+  <dgm:styleLbl name="asst0">
+    <dgm:fillClrLst meth="repeat">
+      <a:schemeClr val="accent2"/>
+    </dgm:fillClrLst>
+    <dgm:linClrLst meth="repeat">
+      <a:schemeClr val="lt1">
+        <a:shade val="80000"/>
+      </a:schemeClr>
+    </dgm:linClrLst>
+    <dgm:effectClrLst/>
+    <dgm:txLinClrLst/>
+    <dgm:txFillClrLst/>
+    <dgm:txEffectClrLst/>
+  </dgm:styleLbl>
+  <dgm:styleLbl name="asst1">
+    <dgm:fillClrLst meth="repeat">
+      <a:schemeClr val="accent3"/>
+    </dgm:fillClrLst>
+    <dgm:linClrLst meth="repeat">
+      <a:schemeClr val="lt1">
+        <a:shade val="80000"/>
+      </a:schemeClr>
+    </dgm:linClrLst>
+    <dgm:effectClrLst/>
+    <dgm:txLinClrLst/>
+    <dgm:txFillClrLst/>
+    <dgm:txEffectClrLst/>
+  </dgm:styleLbl>
+  <dgm:styleLbl name="asst2">
+    <dgm:fillClrLst>
+      <a:schemeClr val="accent4"/>
+    </dgm:fillClrLst>
+    <dgm:linClrLst meth="repeat">
+      <a:schemeClr val="lt1"/>
+    </dgm:linClrLst>
+    <dgm:effectClrLst/>
+    <dgm:txLinClrLst/>
+    <dgm:txFillClrLst/>
+    <dgm:txEffectClrLst/>
+  </dgm:styleLbl>
+  <dgm:styleLbl name="asst3">
+    <dgm:fillClrLst>
+      <a:schemeClr val="accent5"/>
+    </dgm:fillClrLst>
+    <dgm:linClrLst meth="repeat">
+      <a:schemeClr val="lt1"/>
+    </dgm:linClrLst>
+    <dgm:effectClrLst/>
+    <dgm:txLinClrLst/>
+    <dgm:txFillClrLst/>
+    <dgm:txEffectClrLst/>
+  </dgm:styleLbl>
+  <dgm:styleLbl name="asst4">
+    <dgm:fillClrLst>
+      <a:schemeClr val="accent6"/>
+    </dgm:fillClrLst>
+    <dgm:linClrLst meth="repeat">
+      <a:schemeClr val="lt1"/>
+    </dgm:linClrLst>
+    <dgm:effectClrLst/>
+    <dgm:txLinClrLst/>
+    <dgm:txFillClrLst/>
+    <dgm:txEffectClrLst/>
+  </dgm:styleLbl>
+  <dgm:styleLbl name="parChTrans2D1">
+    <dgm:fillClrLst meth="repeat">
+      <a:schemeClr val="accent2"/>
+    </dgm:fillClrLst>
+    <dgm:linClrLst meth="repeat">
+      <a:schemeClr val="lt1"/>
+    </dgm:linClrLst>
+    <dgm:effectClrLst/>
+    <dgm:txLinClrLst/>
+    <dgm:txFillClrLst meth="repeat">
+      <a:schemeClr val="lt1"/>
+    </dgm:txFillClrLst>
+    <dgm:txEffectClrLst/>
+  </dgm:styleLbl>
+  <dgm:styleLbl name="parChTrans2D2">
+    <dgm:fillClrLst meth="repeat">
+      <a:schemeClr val="accent3"/>
+    </dgm:fillClrLst>
+    <dgm:linClrLst meth="repeat">
+      <a:schemeClr val="lt1"/>
+    </dgm:linClrLst>
+    <dgm:effectClrLst/>
+    <dgm:txLinClrLst/>
+    <dgm:txFillClrLst/>
+    <dgm:txEffectClrLst/>
+  </dgm:styleLbl>
+  <dgm:styleLbl name="parChTrans2D3">
+    <dgm:fillClrLst meth="repeat">
+      <a:schemeClr val="accent4"/>
+    </dgm:fillClrLst>
+    <dgm:linClrLst meth="repeat">
+      <a:schemeClr val="lt1"/>
+    </dgm:linClrLst>
+    <dgm:effectClrLst/>
+    <dgm:txLinClrLst/>
+    <dgm:txFillClrLst/>
+    <dgm:txEffectClrLst/>
+  </dgm:styleLbl>
+  <dgm:styleLbl name="parChTrans2D4">
+    <dgm:fillClrLst meth="repeat">
+      <a:schemeClr val="accent5"/>
+    </dgm:fillClrLst>
+    <dgm:linClrLst meth="repeat">
+      <a:schemeClr val="lt1"/>
+    </dgm:linClrLst>
+    <dgm:effectClrLst/>
+    <dgm:txLinClrLst/>
+    <dgm:txFillClrLst meth="repeat">
+      <a:schemeClr val="lt1"/>
+    </dgm:txFillClrLst>
+    <dgm:txEffectClrLst/>
+  </dgm:styleLbl>
+  <dgm:styleLbl name="parChTrans1D1">
+    <dgm:fillClrLst meth="repeat">
+      <a:schemeClr val="accent2"/>
+    </dgm:fillClrLst>
+    <dgm:linClrLst meth="repeat">
+      <a:schemeClr val="accent2"/>
+    </dgm:linClrLst>
+    <dgm:effectClrLst/>
+    <dgm:txLinClrLst/>
+    <dgm:txFillClrLst meth="repeat">
+      <a:schemeClr val="tx1"/>
+    </dgm:txFillClrLst>
+    <dgm:txEffectClrLst/>
+  </dgm:styleLbl>
+  <dgm:styleLbl name="parChTrans1D2">
+    <dgm:fillClrLst meth="repeat">
+      <a:schemeClr val="accent2">
+        <a:tint val="90000"/>
+      </a:schemeClr>
+    </dgm:fillClrLst>
+    <dgm:linClrLst meth="repeat">
+      <a:schemeClr val="accent3"/>
+    </dgm:linClrLst>
+    <dgm:effectClrLst/>
+    <dgm:txLinClrLst/>
+    <dgm:txFillClrLst meth="repeat">
+      <a:schemeClr val="tx1"/>
+    </dgm:txFillClrLst>
+    <dgm:txEffectClrLst/>
+  </dgm:styleLbl>
+  <dgm:styleLbl name="parChTrans1D3">
+    <dgm:fillClrLst meth="repeat">
+      <a:schemeClr val="accent2">
+        <a:tint val="70000"/>
+      </a:schemeClr>
+    </dgm:fillClrLst>
+    <dgm:linClrLst meth="repeat">
+      <a:schemeClr val="accent4"/>
+    </dgm:linClrLst>
+    <dgm:effectClrLst/>
+    <dgm:txLinClrLst/>
+    <dgm:txFillClrLst meth="repeat">
+      <a:schemeClr val="tx1"/>
+    </dgm:txFillClrLst>
+    <dgm:txEffectClrLst/>
+  </dgm:styleLbl>
+  <dgm:styleLbl name="parChTrans1D4">
+    <dgm:fillClrLst meth="repeat">
+      <a:schemeClr val="accent2">
+        <a:tint val="50000"/>
+      </a:schemeClr>
+    </dgm:fillClrLst>
+    <dgm:linClrLst meth="repeat">
+      <a:schemeClr val="accent5"/>
+    </dgm:linClrLst>
+    <dgm:effectClrLst/>
+    <dgm:txLinClrLst/>
+    <dgm:txFillClrLst meth="repeat">
+      <a:schemeClr val="tx1"/>
+    </dgm:txFillClrLst>
+    <dgm:txEffectClrLst/>
+  </dgm:styleLbl>
+  <dgm:styleLbl name="fgAcc1">
+    <dgm:fillClrLst meth="repeat">
+      <a:schemeClr val="lt1">
+        <a:alpha val="90000"/>
+      </a:schemeClr>
+    </dgm:fillClrLst>
+    <dgm:linClrLst>
+      <a:schemeClr val="accent2"/>
+      <a:schemeClr val="accent3"/>
+    </dgm:linClrLst>
+    <dgm:effectClrLst/>
+    <dgm:txLinClrLst/>
+    <dgm:txFillClrLst meth="repeat">
+      <a:schemeClr val="dk1"/>
+    </dgm:txFillClrLst>
+    <dgm:txEffectClrLst/>
+  </dgm:styleLbl>
+  <dgm:styleLbl name="conFgAcc1">
+    <dgm:fillClrLst meth="repeat">
+      <a:schemeClr val="lt1">
+        <a:alpha val="90000"/>
+      </a:schemeClr>
+    </dgm:fillClrLst>
+    <dgm:linClrLst>
+      <a:schemeClr val="accent2"/>
+      <a:schemeClr val="accent3"/>
+    </dgm:linClrLst>
+    <dgm:effectClrLst/>
+    <dgm:txLinClrLst/>
+    <dgm:txFillClrLst meth="repeat">
+      <a:schemeClr val="dk1"/>
+    </dgm:txFillClrLst>
+    <dgm:txEffectClrLst/>
+  </dgm:styleLbl>
+  <dgm:styleLbl name="alignAcc1">
+    <dgm:fillClrLst meth="repeat">
+      <a:schemeClr val="lt1">
+        <a:alpha val="90000"/>
+      </a:schemeClr>
+    </dgm:fillClrLst>
+    <dgm:linClrLst>
+      <a:schemeClr val="accent2"/>
+      <a:schemeClr val="accent3"/>
+    </dgm:linClrLst>
+    <dgm:effectClrLst/>
+    <dgm:txLinClrLst/>
+    <dgm:txFillClrLst meth="repeat">
+      <a:schemeClr val="dk1"/>
+    </dgm:txFillClrLst>
+    <dgm:txEffectClrLst/>
+  </dgm:styleLbl>
+  <dgm:styleLbl name="trAlignAcc1">
+    <dgm:fillClrLst meth="repeat">
+      <a:schemeClr val="lt1">
+        <a:alpha val="40000"/>
+      </a:schemeClr>
+    </dgm:fillClrLst>
+    <dgm:linClrLst meth="repeat">
+      <a:schemeClr val="accent2"/>
+    </dgm:linClrLst>
+    <dgm:effectClrLst/>
+    <dgm:txLinClrLst/>
+    <dgm:txFillClrLst meth="repeat">
+      <a:schemeClr val="dk1"/>
+    </dgm:txFillClrLst>
+    <dgm:txEffectClrLst/>
+  </dgm:styleLbl>
+  <dgm:styleLbl name="bgAcc1">
+    <dgm:fillClrLst meth="repeat">
+      <a:schemeClr val="lt1">
+        <a:alpha val="90000"/>
+      </a:schemeClr>
+    </dgm:fillClrLst>
+    <dgm:linClrLst>
+      <a:schemeClr val="accent2"/>
+      <a:schemeClr val="accent3"/>
+    </dgm:linClrLst>
+    <dgm:effectClrLst/>
+    <dgm:txLinClrLst/>
+    <dgm:txFillClrLst meth="repeat">
+      <a:schemeClr val="dk1"/>
+    </dgm:txFillClrLst>
+    <dgm:txEffectClrLst/>
+  </dgm:styleLbl>
+  <dgm:styleLbl name="solidFgAcc1">
+    <dgm:fillClrLst meth="repeat">
+      <a:schemeClr val="lt1"/>
+    </dgm:fillClrLst>
+    <dgm:linClrLst>
+      <a:schemeClr val="accent2"/>
+      <a:schemeClr val="accent3"/>
+    </dgm:linClrLst>
+    <dgm:effectClrLst/>
+    <dgm:txLinClrLst/>
+    <dgm:txFillClrLst meth="repeat">
+      <a:schemeClr val="dk1"/>
+    </dgm:txFillClrLst>
+    <dgm:txEffectClrLst/>
+  </dgm:styleLbl>
+  <dgm:styleLbl name="solidAlignAcc1">
+    <dgm:fillClrLst meth="repeat">
+      <a:schemeClr val="lt1"/>
+    </dgm:fillClrLst>
+    <dgm:linClrLst>
+      <a:schemeClr val="accent2"/>
+      <a:schemeClr val="accent3"/>
+    </dgm:linClrLst>
+    <dgm:effectClrLst/>
+    <dgm:txLinClrLst/>
+    <dgm:txFillClrLst meth="repeat">
+      <a:schemeClr val="dk1"/>
+    </dgm:txFillClrLst>
+    <dgm:txEffectClrLst/>
+  </dgm:styleLbl>
+  <dgm:styleLbl name="solidBgAcc1">
+    <dgm:fillClrLst meth="repeat">
+      <a:schemeClr val="lt1"/>
+    </dgm:fillClrLst>
+    <dgm:linClrLst>
+      <a:schemeClr val="accent2"/>
+      <a:schemeClr val="accent3"/>
+    </dgm:linClrLst>
+    <dgm:effectClrLst/>
+    <dgm:txLinClrLst/>
+    <dgm:txFillClrLst meth="repeat">
+      <a:schemeClr val="dk1"/>
+    </dgm:txFillClrLst>
+    <dgm:txEffectClrLst/>
+  </dgm:styleLbl>
+  <dgm:styleLbl name="fgAccFollowNode1">
+    <dgm:fillClrLst>
+      <a:schemeClr val="accent2">
+        <a:tint val="40000"/>
+        <a:alpha val="90000"/>
+      </a:schemeClr>
+      <a:schemeClr val="accent3">
+        <a:tint val="40000"/>
+        <a:alpha val="90000"/>
+      </a:schemeClr>
+    </dgm:fillClrLst>
+    <dgm:linClrLst>
+      <a:schemeClr val="accent2">
+        <a:tint val="40000"/>
+        <a:alpha val="90000"/>
+      </a:schemeClr>
+      <a:schemeClr val="accent3">
+        <a:tint val="40000"/>
+        <a:alpha val="90000"/>
+      </a:schemeClr>
+    </dgm:linClrLst>
+    <dgm:effectClrLst/>
+    <dgm:txLinClrLst/>
+    <dgm:txFillClrLst meth="repeat">
+      <a:schemeClr val="dk1"/>
+    </dgm:txFillClrLst>
+    <dgm:txEffectClrLst/>
+  </dgm:styleLbl>
+  <dgm:styleLbl name="alignAccFollowNode1">
+    <dgm:fillClrLst>
+      <a:schemeClr val="accent2">
+        <a:tint val="40000"/>
+        <a:alpha val="90000"/>
+      </a:schemeClr>
+      <a:schemeClr val="accent3">
+        <a:tint val="40000"/>
+        <a:alpha val="90000"/>
+      </a:schemeClr>
+    </dgm:fillClrLst>
+    <dgm:linClrLst>
+      <a:schemeClr val="accent2">
+        <a:tint val="40000"/>
+        <a:alpha val="90000"/>
+      </a:schemeClr>
+      <a:schemeClr val="accent3">
+        <a:tint val="40000"/>
+        <a:alpha val="90000"/>
+      </a:schemeClr>
+    </dgm:linClrLst>
+    <dgm:effectClrLst/>
+    <dgm:txLinClrLst/>
+    <dgm:txFillClrLst meth="repeat">
+      <a:schemeClr val="dk1"/>
+    </dgm:txFillClrLst>
+    <dgm:txEffectClrLst/>
+  </dgm:styleLbl>
+  <dgm:styleLbl name="bgAccFollowNode1">
+    <dgm:fillClrLst>
+      <a:schemeClr val="accent2">
+        <a:tint val="40000"/>
+        <a:alpha val="90000"/>
+      </a:schemeClr>
+      <a:schemeClr val="accent3">
+        <a:tint val="40000"/>
+        <a:alpha val="90000"/>
+      </a:schemeClr>
+    </dgm:fillClrLst>
+    <dgm:linClrLst>
+      <a:schemeClr val="accent2">
+        <a:tint val="40000"/>
+        <a:alpha val="90000"/>
+      </a:schemeClr>
+      <a:schemeClr val="accent3">
+        <a:tint val="40000"/>
+        <a:alpha val="90000"/>
+      </a:schemeClr>
+    </dgm:linClrLst>
+    <dgm:effectClrLst/>
+    <dgm:txLinClrLst/>
+    <dgm:txFillClrLst meth="repeat">
+      <a:schemeClr val="dk1"/>
+    </dgm:txFillClrLst>
+    <dgm:txEffectClrLst/>
+  </dgm:styleLbl>
+  <dgm:styleLbl name="fgAcc0">
+    <dgm:fillClrLst meth="repeat">
+      <a:schemeClr val="lt1">
+        <a:alpha val="90000"/>
+      </a:schemeClr>
+    </dgm:fillClrLst>
+    <dgm:linClrLst>
+      <a:schemeClr val="accent1"/>
+    </dgm:linClrLst>
+    <dgm:effectClrLst/>
+    <dgm:txLinClrLst/>
+    <dgm:txFillClrLst meth="repeat">
+      <a:schemeClr val="dk1"/>
+    </dgm:txFillClrLst>
+    <dgm:txEffectClrLst/>
+  </dgm:styleLbl>
+  <dgm:styleLbl name="fgAcc2">
+    <dgm:fillClrLst meth="repeat">
+      <a:schemeClr val="lt1">
+        <a:alpha val="90000"/>
+      </a:schemeClr>
+    </dgm:fillClrLst>
+    <dgm:linClrLst>
+      <a:schemeClr val="accent3"/>
+    </dgm:linClrLst>
+    <dgm:effectClrLst/>
+    <dgm:txLinClrLst/>
+    <dgm:txFillClrLst meth="repeat">
+      <a:schemeClr val="dk1"/>
+    </dgm:txFillClrLst>
+    <dgm:txEffectClrLst/>
+  </dgm:styleLbl>
+  <dgm:styleLbl name="fgAcc3">
+    <dgm:fillClrLst meth="repeat">
+      <a:schemeClr val="lt1">
+        <a:alpha val="90000"/>
+      </a:schemeClr>
+    </dgm:fillClrLst>
+    <dgm:linClrLst>
+      <a:schemeClr val="accent4"/>
+    </dgm:linClrLst>
+    <dgm:effectClrLst/>
+    <dgm:txLinClrLst/>
+    <dgm:txFillClrLst meth="repeat">
+      <a:schemeClr val="dk1"/>
+    </dgm:txFillClrLst>
+    <dgm:txEffectClrLst/>
+  </dgm:styleLbl>
+  <dgm:styleLbl name="fgAcc4">
+    <dgm:fillClrLst meth="repeat">
+      <a:schemeClr val="lt1">
+        <a:alpha val="90000"/>
+      </a:schemeClr>
+    </dgm:fillClrLst>
+    <dgm:linClrLst>
+      <a:schemeClr val="accent5"/>
+    </dgm:linClrLst>
+    <dgm:effectClrLst/>
+    <dgm:txLinClrLst/>
+    <dgm:txFillClrLst meth="repeat">
+      <a:schemeClr val="dk1"/>
+    </dgm:txFillClrLst>
+    <dgm:txEffectClrLst/>
+  </dgm:styleLbl>
+  <dgm:styleLbl name="bgShp">
+    <dgm:fillClrLst meth="repeat">
+      <a:schemeClr val="accent2">
+        <a:tint val="40000"/>
+      </a:schemeClr>
+    </dgm:fillClrLst>
+    <dgm:linClrLst meth="repeat">
+      <a:schemeClr val="dk1"/>
+    </dgm:linClrLst>
+    <dgm:effectClrLst/>
+    <dgm:txLinClrLst/>
+    <dgm:txFillClrLst meth="repeat">
+      <a:schemeClr val="dk1"/>
+    </dgm:txFillClrLst>
+    <dgm:txEffectClrLst/>
+  </dgm:styleLbl>
+  <dgm:styleLbl name="dkBgShp">
+    <dgm:fillClrLst meth="repeat">
+      <a:schemeClr val="accent2">
+        <a:shade val="90000"/>
+      </a:schemeClr>
+    </dgm:fillClrLst>
+    <dgm:linClrLst meth="repeat">
+      <a:schemeClr val="dk1"/>
+    </dgm:linClrLst>
+    <dgm:effectClrLst/>
+    <dgm:txLinClrLst/>
+    <dgm:txFillClrLst meth="repeat">
+      <a:schemeClr val="lt1"/>
+    </dgm:txFillClrLst>
+    <dgm:txEffectClrLst/>
+  </dgm:styleLbl>
+  <dgm:styleLbl name="trBgShp">
+    <dgm:fillClrLst meth="repeat">
+      <a:schemeClr val="accent2">
+        <a:tint val="50000"/>
+        <a:alpha val="40000"/>
+      </a:schemeClr>
+    </dgm:fillClrLst>
+    <dgm:linClrLst meth="repeat">
+      <a:schemeClr val="accent2"/>
+    </dgm:linClrLst>
+    <dgm:effectClrLst/>
+    <dgm:txLinClrLst/>
+    <dgm:txFillClrLst meth="repeat">
+      <a:schemeClr val="lt1"/>
+    </dgm:txFillClrLst>
+    <dgm:txEffectClrLst/>
+  </dgm:styleLbl>
+  <dgm:styleLbl name="fgShp">
+    <dgm:fillClrLst meth="repeat">
+      <a:schemeClr val="accent2">
+        <a:tint val="40000"/>
+      </a:schemeClr>
+    </dgm:fillClrLst>
+    <dgm:linClrLst meth="repeat">
+      <a:schemeClr val="lt1"/>
+    </dgm:linClrLst>
+    <dgm:effectClrLst/>
+    <dgm:txLinClrLst/>
+    <dgm:txFillClrLst meth="repeat">
+      <a:schemeClr val="dk1"/>
+    </dgm:txFillClrLst>
+    <dgm:txEffectClrLst/>
+  </dgm:styleLbl>
+  <dgm:styleLbl name="revTx">
+    <dgm:fillClrLst meth="repeat">
+      <a:schemeClr val="lt1">
+        <a:alpha val="0"/>
+      </a:schemeClr>
+    </dgm:fillClrLst>
+    <dgm:linClrLst meth="repeat">
+      <a:schemeClr val="dk1">
+        <a:alpha val="0"/>
+      </a:schemeClr>
+    </dgm:linClrLst>
+    <dgm:effectClrLst/>
+    <dgm:txLinClrLst/>
+    <dgm:txFillClrLst meth="repeat">
+      <a:schemeClr val="tx1"/>
+    </dgm:txFillClrLst>
+    <dgm:txEffectClrLst/>
+  </dgm:styleLbl>
+</dgm:colorsDef>
+</file>
+
+<file path=ppt/diagrams/colors3.xml><?xml version="1.0" encoding="utf-8"?>
 <dgm:colorsDef xmlns:dgm="http://schemas.openxmlformats.org/drawingml/2006/diagram" xmlns:a="http://schemas.openxmlformats.org/drawingml/2006/main" uniqueId="urn:microsoft.com/office/officeart/2005/8/colors/colorful2">
   <dgm:title val=""/>
   <dgm:desc val=""/>
@@ -1734,7 +2522,7 @@
         </a:p>
       </dgm:t>
     </dgm:pt>
-    <dgm:pt modelId="{467C4D64-4502-44B4-B5E6-352619F92F37}">
+    <dgm:pt modelId="{4B43EC84-C715-458D-9A28-740C7F4DACB3}">
       <dgm:prSet phldrT="[Text]"/>
       <dgm:spPr/>
       <dgm:t>
@@ -1748,7 +2536,7 @@
         </a:p>
       </dgm:t>
     </dgm:pt>
-    <dgm:pt modelId="{783C9ABE-2C68-4167-86E3-AEAC88B12F50}" type="parTrans" cxnId="{75B51CD6-85F5-49EF-8B54-432189EB4409}">
+    <dgm:pt modelId="{4523DE7D-A5D0-495C-B39B-594B6CAB80A6}" type="parTrans" cxnId="{9878C119-015C-4908-9564-F3A1D389C5CA}">
       <dgm:prSet/>
       <dgm:spPr/>
       <dgm:t>
@@ -1759,7 +2547,7 @@
         </a:p>
       </dgm:t>
     </dgm:pt>
-    <dgm:pt modelId="{D3302E66-77BF-4ADD-BE51-9389457F610A}" type="sibTrans" cxnId="{75B51CD6-85F5-49EF-8B54-432189EB4409}">
+    <dgm:pt modelId="{813A7E43-27F6-493B-9E47-56829CA96FEF}" type="sibTrans" cxnId="{9878C119-015C-4908-9564-F3A1D389C5CA}">
       <dgm:prSet/>
       <dgm:spPr/>
       <dgm:t>
@@ -1770,7 +2558,7 @@
         </a:p>
       </dgm:t>
     </dgm:pt>
-    <dgm:pt modelId="{ADDE1BC1-06C9-4BB0-82DB-3AF42F7E517E}">
+    <dgm:pt modelId="{587C58EA-AD52-4F99-A546-00EF30C20444}">
       <dgm:prSet phldrT="[Text]"/>
       <dgm:spPr/>
       <dgm:t>
@@ -1784,7 +2572,7 @@
         </a:p>
       </dgm:t>
     </dgm:pt>
-    <dgm:pt modelId="{C7F8F7F6-9DBF-43D3-B01E-B7AD6C49FF7D}" type="parTrans" cxnId="{81E6742B-DAD0-4C8E-ADC6-739F34878206}">
+    <dgm:pt modelId="{F3F9CE0E-9E57-4A2E-8789-943F15D35089}" type="parTrans" cxnId="{B49EE0AE-C503-4932-A6CA-2BED2EEC2ABA}">
       <dgm:prSet/>
       <dgm:spPr/>
       <dgm:t>
@@ -1795,7 +2583,7 @@
         </a:p>
       </dgm:t>
     </dgm:pt>
-    <dgm:pt modelId="{12104CCB-A9CC-4F64-BA69-686C0E62FD31}" type="sibTrans" cxnId="{81E6742B-DAD0-4C8E-ADC6-739F34878206}">
+    <dgm:pt modelId="{73045B6E-2F71-42F2-B407-E2B4B8BAF867}" type="sibTrans" cxnId="{B49EE0AE-C503-4932-A6CA-2BED2EEC2ABA}">
       <dgm:prSet/>
       <dgm:spPr/>
       <dgm:t>
@@ -1806,7 +2594,7 @@
         </a:p>
       </dgm:t>
     </dgm:pt>
-    <dgm:pt modelId="{CE296EC6-1843-4B39-BCCB-6DBF4B15C5C8}">
+    <dgm:pt modelId="{01A39ADB-F3CC-4135-8C3F-842E56BD0226}">
       <dgm:prSet phldrT="[Text]"/>
       <dgm:spPr/>
       <dgm:t>
@@ -1820,7 +2608,7 @@
         </a:p>
       </dgm:t>
     </dgm:pt>
-    <dgm:pt modelId="{F5DF28CD-7DFB-43D7-A735-FA2955AB7922}" type="parTrans" cxnId="{3CCF07C8-5F1D-4084-8216-42393FC5091F}">
+    <dgm:pt modelId="{2C80704A-4D8E-4705-AA24-A4AD01BA81A3}" type="parTrans" cxnId="{568D749E-748C-4217-B2FD-8F3FFD79CDCD}">
       <dgm:prSet/>
       <dgm:spPr/>
       <dgm:t>
@@ -1831,7 +2619,7 @@
         </a:p>
       </dgm:t>
     </dgm:pt>
-    <dgm:pt modelId="{B06596B6-9AB1-42ED-82AC-27A4DA6D80CE}" type="sibTrans" cxnId="{3CCF07C8-5F1D-4084-8216-42393FC5091F}">
+    <dgm:pt modelId="{69E82D88-6EAE-463D-BCDF-037AF9FF90F2}" type="sibTrans" cxnId="{568D749E-748C-4217-B2FD-8F3FFD79CDCD}">
       <dgm:prSet/>
       <dgm:spPr/>
       <dgm:t>
@@ -1842,7 +2630,7 @@
         </a:p>
       </dgm:t>
     </dgm:pt>
-    <dgm:pt modelId="{34FC4429-DB6E-4657-99E3-33BE71C4A037}">
+    <dgm:pt modelId="{FAB469D4-2147-49ED-A532-1F659D6AF1C6}">
       <dgm:prSet phldrT="[Text]"/>
       <dgm:spPr/>
       <dgm:t>
@@ -1856,7 +2644,7 @@
         </a:p>
       </dgm:t>
     </dgm:pt>
-    <dgm:pt modelId="{BE619BE5-B4B3-4953-A656-BC0A2014BCDE}" type="parTrans" cxnId="{ACCF2763-61E2-4EAD-9977-83F0F37FC7C6}">
+    <dgm:pt modelId="{FAB215E2-D6A7-487D-99A7-02A567566206}" type="parTrans" cxnId="{F7F864A6-B6D5-4BC1-9A79-C7815D9DB318}">
       <dgm:prSet/>
       <dgm:spPr/>
       <dgm:t>
@@ -1867,7 +2655,7 @@
         </a:p>
       </dgm:t>
     </dgm:pt>
-    <dgm:pt modelId="{381DBD94-B9FB-4E0F-9A60-3C7FF4C900F6}" type="sibTrans" cxnId="{ACCF2763-61E2-4EAD-9977-83F0F37FC7C6}">
+    <dgm:pt modelId="{C3629D5D-FD45-4026-A6F0-5928C6BCC154}" type="sibTrans" cxnId="{F7F864A6-B6D5-4BC1-9A79-C7815D9DB318}">
       <dgm:prSet/>
       <dgm:spPr/>
       <dgm:t>
@@ -1878,7 +2666,7 @@
         </a:p>
       </dgm:t>
     </dgm:pt>
-    <dgm:pt modelId="{FE715415-56E1-4B1D-9462-0A89B5669D9F}">
+    <dgm:pt modelId="{6272BE58-0320-45B5-8140-8696C83D6C4E}">
       <dgm:prSet phldrT="[Text]"/>
       <dgm:spPr/>
       <dgm:t>
@@ -1892,7 +2680,7 @@
         </a:p>
       </dgm:t>
     </dgm:pt>
-    <dgm:pt modelId="{36FC3FBC-E9B9-410C-ACAE-6CCF07886911}" type="parTrans" cxnId="{AAA0E928-F521-4469-9D25-AD9C9758F45F}">
+    <dgm:pt modelId="{469935A5-0F32-41BE-8EDF-00AA85C5B186}" type="parTrans" cxnId="{B7A9227E-AEAB-43DE-A40B-B7E0CDA756CD}">
       <dgm:prSet/>
       <dgm:spPr/>
       <dgm:t>
@@ -1903,7 +2691,7 @@
         </a:p>
       </dgm:t>
     </dgm:pt>
-    <dgm:pt modelId="{FBD20F4A-D130-4A28-951E-F510AE3C16F6}" type="sibTrans" cxnId="{AAA0E928-F521-4469-9D25-AD9C9758F45F}">
+    <dgm:pt modelId="{277E4E2C-9FA5-4C51-ABC0-8965956A0127}" type="sibTrans" cxnId="{B7A9227E-AEAB-43DE-A40B-B7E0CDA756CD}">
       <dgm:prSet/>
       <dgm:spPr/>
       <dgm:t>
@@ -1935,56 +2723,56 @@
       <dgm:prSet presAssocID="{C99FA0AA-72DB-4826-B9E7-E65F28D01946}" presName="sibTrans" presStyleCnt="0"/>
       <dgm:spPr/>
     </dgm:pt>
-    <dgm:pt modelId="{A4256277-62EE-4890-9461-C9013E489523}" type="pres">
-      <dgm:prSet presAssocID="{467C4D64-4502-44B4-B5E6-352619F92F37}" presName="node" presStyleLbl="node1" presStyleIdx="1" presStyleCnt="6">
+    <dgm:pt modelId="{67AE67B3-A238-48F2-8A36-DE8487384B01}" type="pres">
+      <dgm:prSet presAssocID="{4B43EC84-C715-458D-9A28-740C7F4DACB3}" presName="node" presStyleLbl="node1" presStyleIdx="1" presStyleCnt="6">
         <dgm:presLayoutVars>
           <dgm:bulletEnabled val="1"/>
         </dgm:presLayoutVars>
       </dgm:prSet>
       <dgm:spPr/>
     </dgm:pt>
-    <dgm:pt modelId="{CFE2C22B-4623-4A2E-BEA9-5C15A844B85C}" type="pres">
-      <dgm:prSet presAssocID="{D3302E66-77BF-4ADD-BE51-9389457F610A}" presName="sibTrans" presStyleCnt="0"/>
+    <dgm:pt modelId="{B57A46B8-3808-45A7-8358-9C1786E9B61A}" type="pres">
+      <dgm:prSet presAssocID="{813A7E43-27F6-493B-9E47-56829CA96FEF}" presName="sibTrans" presStyleCnt="0"/>
       <dgm:spPr/>
     </dgm:pt>
-    <dgm:pt modelId="{0316D1D0-8024-4D1D-AE4C-57BAF0749AC8}" type="pres">
-      <dgm:prSet presAssocID="{ADDE1BC1-06C9-4BB0-82DB-3AF42F7E517E}" presName="node" presStyleLbl="node1" presStyleIdx="2" presStyleCnt="6">
+    <dgm:pt modelId="{12235D26-346A-4F02-BA22-FBC4F3EDFF9C}" type="pres">
+      <dgm:prSet presAssocID="{587C58EA-AD52-4F99-A546-00EF30C20444}" presName="node" presStyleLbl="node1" presStyleIdx="2" presStyleCnt="6">
         <dgm:presLayoutVars>
           <dgm:bulletEnabled val="1"/>
         </dgm:presLayoutVars>
       </dgm:prSet>
       <dgm:spPr/>
     </dgm:pt>
-    <dgm:pt modelId="{5C17F4F4-9E6F-48E5-8BAF-F17E8A3D743C}" type="pres">
-      <dgm:prSet presAssocID="{12104CCB-A9CC-4F64-BA69-686C0E62FD31}" presName="sibTrans" presStyleCnt="0"/>
+    <dgm:pt modelId="{40169D44-50EF-4A2B-BCE8-CE359A60E03D}" type="pres">
+      <dgm:prSet presAssocID="{73045B6E-2F71-42F2-B407-E2B4B8BAF867}" presName="sibTrans" presStyleCnt="0"/>
       <dgm:spPr/>
     </dgm:pt>
-    <dgm:pt modelId="{6C9E2FAC-7F24-46A9-B5FC-2AE3E533DFF9}" type="pres">
-      <dgm:prSet presAssocID="{CE296EC6-1843-4B39-BCCB-6DBF4B15C5C8}" presName="node" presStyleLbl="node1" presStyleIdx="3" presStyleCnt="6">
+    <dgm:pt modelId="{9B7FDEC1-C852-40AD-9288-439B62C995B4}" type="pres">
+      <dgm:prSet presAssocID="{01A39ADB-F3CC-4135-8C3F-842E56BD0226}" presName="node" presStyleLbl="node1" presStyleIdx="3" presStyleCnt="6">
         <dgm:presLayoutVars>
           <dgm:bulletEnabled val="1"/>
         </dgm:presLayoutVars>
       </dgm:prSet>
       <dgm:spPr/>
     </dgm:pt>
-    <dgm:pt modelId="{CB3CD7B3-67B0-412B-BEC6-B03498149E0D}" type="pres">
-      <dgm:prSet presAssocID="{B06596B6-9AB1-42ED-82AC-27A4DA6D80CE}" presName="sibTrans" presStyleCnt="0"/>
+    <dgm:pt modelId="{965DBC06-2026-48F3-843D-AC42F47E2C88}" type="pres">
+      <dgm:prSet presAssocID="{69E82D88-6EAE-463D-BCDF-037AF9FF90F2}" presName="sibTrans" presStyleCnt="0"/>
       <dgm:spPr/>
     </dgm:pt>
-    <dgm:pt modelId="{A8270942-746C-4EAA-8837-16EFE7FAFDE7}" type="pres">
-      <dgm:prSet presAssocID="{34FC4429-DB6E-4657-99E3-33BE71C4A037}" presName="node" presStyleLbl="node1" presStyleIdx="4" presStyleCnt="6">
+    <dgm:pt modelId="{A9CC1E8F-B0C3-4BE0-A70D-30F04DB17629}" type="pres">
+      <dgm:prSet presAssocID="{FAB469D4-2147-49ED-A532-1F659D6AF1C6}" presName="node" presStyleLbl="node1" presStyleIdx="4" presStyleCnt="6">
         <dgm:presLayoutVars>
           <dgm:bulletEnabled val="1"/>
         </dgm:presLayoutVars>
       </dgm:prSet>
       <dgm:spPr/>
     </dgm:pt>
-    <dgm:pt modelId="{D38FD5E4-6D03-47FC-810F-4B106BD73689}" type="pres">
-      <dgm:prSet presAssocID="{381DBD94-B9FB-4E0F-9A60-3C7FF4C900F6}" presName="sibTrans" presStyleCnt="0"/>
+    <dgm:pt modelId="{3EAD27B0-809C-4D7B-83F3-A710FCAE0364}" type="pres">
+      <dgm:prSet presAssocID="{C3629D5D-FD45-4026-A6F0-5928C6BCC154}" presName="sibTrans" presStyleCnt="0"/>
       <dgm:spPr/>
     </dgm:pt>
-    <dgm:pt modelId="{6FC5C050-4B6B-4C5E-AFC5-AACA9FC28393}" type="pres">
-      <dgm:prSet presAssocID="{FE715415-56E1-4B1D-9462-0A89B5669D9F}" presName="node" presStyleLbl="node1" presStyleIdx="5" presStyleCnt="6">
+    <dgm:pt modelId="{F37FC58E-235F-41FA-AB31-A387CAF2E6FA}" type="pres">
+      <dgm:prSet presAssocID="{6272BE58-0320-45B5-8140-8696C83D6C4E}" presName="node" presStyleLbl="node1" presStyleIdx="5" presStyleCnt="6">
         <dgm:presLayoutVars>
           <dgm:bulletEnabled val="1"/>
         </dgm:presLayoutVars>
@@ -1993,30 +2781,30 @@
     </dgm:pt>
   </dgm:ptLst>
   <dgm:cxnLst>
-    <dgm:cxn modelId="{AAA0E928-F521-4469-9D25-AD9C9758F45F}" srcId="{00F3AAFD-C7F1-41DC-8C40-A6C89ECE87C0}" destId="{FE715415-56E1-4B1D-9462-0A89B5669D9F}" srcOrd="5" destOrd="0" parTransId="{36FC3FBC-E9B9-410C-ACAE-6CCF07886911}" sibTransId="{FBD20F4A-D130-4A28-951E-F510AE3C16F6}"/>
-    <dgm:cxn modelId="{81E6742B-DAD0-4C8E-ADC6-739F34878206}" srcId="{00F3AAFD-C7F1-41DC-8C40-A6C89ECE87C0}" destId="{ADDE1BC1-06C9-4BB0-82DB-3AF42F7E517E}" srcOrd="2" destOrd="0" parTransId="{C7F8F7F6-9DBF-43D3-B01E-B7AD6C49FF7D}" sibTransId="{12104CCB-A9CC-4F64-BA69-686C0E62FD31}"/>
-    <dgm:cxn modelId="{1CE04236-4339-48CA-869F-8B33DAFE06D9}" type="presOf" srcId="{467C4D64-4502-44B4-B5E6-352619F92F37}" destId="{A4256277-62EE-4890-9461-C9013E489523}" srcOrd="0" destOrd="0" presId="urn:microsoft.com/office/officeart/2005/8/layout/default"/>
+    <dgm:cxn modelId="{A75B5105-B696-4941-A201-DCF27C3750F7}" type="presOf" srcId="{587C58EA-AD52-4F99-A546-00EF30C20444}" destId="{12235D26-346A-4F02-BA22-FBC4F3EDFF9C}" srcOrd="0" destOrd="0" presId="urn:microsoft.com/office/officeart/2005/8/layout/default"/>
+    <dgm:cxn modelId="{6A5EE418-0CA3-40DA-A56C-28BB9F5ACFB2}" type="presOf" srcId="{FAB469D4-2147-49ED-A532-1F659D6AF1C6}" destId="{A9CC1E8F-B0C3-4BE0-A70D-30F04DB17629}" srcOrd="0" destOrd="0" presId="urn:microsoft.com/office/officeart/2005/8/layout/default"/>
+    <dgm:cxn modelId="{9878C119-015C-4908-9564-F3A1D389C5CA}" srcId="{00F3AAFD-C7F1-41DC-8C40-A6C89ECE87C0}" destId="{4B43EC84-C715-458D-9A28-740C7F4DACB3}" srcOrd="1" destOrd="0" parTransId="{4523DE7D-A5D0-495C-B39B-594B6CAB80A6}" sibTransId="{813A7E43-27F6-493B-9E47-56829CA96FEF}"/>
     <dgm:cxn modelId="{97B47E3F-5360-4BDE-BCC1-F304F86881AE}" type="presOf" srcId="{4D17A255-17A4-4409-B0DE-2C989232B2E9}" destId="{63849ED4-0E53-474A-99EB-BBA8BB2FE9AD}" srcOrd="0" destOrd="0" presId="urn:microsoft.com/office/officeart/2005/8/layout/default"/>
-    <dgm:cxn modelId="{ACCF2763-61E2-4EAD-9977-83F0F37FC7C6}" srcId="{00F3AAFD-C7F1-41DC-8C40-A6C89ECE87C0}" destId="{34FC4429-DB6E-4657-99E3-33BE71C4A037}" srcOrd="4" destOrd="0" parTransId="{BE619BE5-B4B3-4953-A656-BC0A2014BCDE}" sibTransId="{381DBD94-B9FB-4E0F-9A60-3C7FF4C900F6}"/>
-    <dgm:cxn modelId="{2F4AF063-3D86-4B32-8BDF-768EFB63DF23}" type="presOf" srcId="{FE715415-56E1-4B1D-9462-0A89B5669D9F}" destId="{6FC5C050-4B6B-4C5E-AFC5-AACA9FC28393}" srcOrd="0" destOrd="0" presId="urn:microsoft.com/office/officeart/2005/8/layout/default"/>
-    <dgm:cxn modelId="{E6A7AC95-263B-4881-8259-266447261BBB}" type="presOf" srcId="{CE296EC6-1843-4B39-BCCB-6DBF4B15C5C8}" destId="{6C9E2FAC-7F24-46A9-B5FC-2AE3E533DFF9}" srcOrd="0" destOrd="0" presId="urn:microsoft.com/office/officeart/2005/8/layout/default"/>
+    <dgm:cxn modelId="{2E429A5C-3A64-4129-9D4E-14EB95C6EE81}" type="presOf" srcId="{4B43EC84-C715-458D-9A28-740C7F4DACB3}" destId="{67AE67B3-A238-48F2-8A36-DE8487384B01}" srcOrd="0" destOrd="0" presId="urn:microsoft.com/office/officeart/2005/8/layout/default"/>
+    <dgm:cxn modelId="{B7A9227E-AEAB-43DE-A40B-B7E0CDA756CD}" srcId="{00F3AAFD-C7F1-41DC-8C40-A6C89ECE87C0}" destId="{6272BE58-0320-45B5-8140-8696C83D6C4E}" srcOrd="5" destOrd="0" parTransId="{469935A5-0F32-41BE-8EDF-00AA85C5B186}" sibTransId="{277E4E2C-9FA5-4C51-ABC0-8965956A0127}"/>
+    <dgm:cxn modelId="{8C1AAB87-CD18-4DA7-8F6E-DB20873E0496}" type="presOf" srcId="{6272BE58-0320-45B5-8140-8696C83D6C4E}" destId="{F37FC58E-235F-41FA-AB31-A387CAF2E6FA}" srcOrd="0" destOrd="0" presId="urn:microsoft.com/office/officeart/2005/8/layout/default"/>
+    <dgm:cxn modelId="{568D749E-748C-4217-B2FD-8F3FFD79CDCD}" srcId="{00F3AAFD-C7F1-41DC-8C40-A6C89ECE87C0}" destId="{01A39ADB-F3CC-4135-8C3F-842E56BD0226}" srcOrd="3" destOrd="0" parTransId="{2C80704A-4D8E-4705-AA24-A4AD01BA81A3}" sibTransId="{69E82D88-6EAE-463D-BCDF-037AF9FF90F2}"/>
+    <dgm:cxn modelId="{F7F864A6-B6D5-4BC1-9A79-C7815D9DB318}" srcId="{00F3AAFD-C7F1-41DC-8C40-A6C89ECE87C0}" destId="{FAB469D4-2147-49ED-A532-1F659D6AF1C6}" srcOrd="4" destOrd="0" parTransId="{FAB215E2-D6A7-487D-99A7-02A567566206}" sibTransId="{C3629D5D-FD45-4026-A6F0-5928C6BCC154}"/>
+    <dgm:cxn modelId="{B49EE0AE-C503-4932-A6CA-2BED2EEC2ABA}" srcId="{00F3AAFD-C7F1-41DC-8C40-A6C89ECE87C0}" destId="{587C58EA-AD52-4F99-A546-00EF30C20444}" srcOrd="2" destOrd="0" parTransId="{F3F9CE0E-9E57-4A2E-8789-943F15D35089}" sibTransId="{73045B6E-2F71-42F2-B407-E2B4B8BAF867}"/>
     <dgm:cxn modelId="{361173BB-CAC7-4D05-A2D7-522D165390C4}" type="presOf" srcId="{00F3AAFD-C7F1-41DC-8C40-A6C89ECE87C0}" destId="{18C69D56-AC6E-4A41-986D-C880BC21700A}" srcOrd="0" destOrd="0" presId="urn:microsoft.com/office/officeart/2005/8/layout/default"/>
-    <dgm:cxn modelId="{28802CC7-29CA-4512-B476-7C031891F6C6}" type="presOf" srcId="{34FC4429-DB6E-4657-99E3-33BE71C4A037}" destId="{A8270942-746C-4EAA-8837-16EFE7FAFDE7}" srcOrd="0" destOrd="0" presId="urn:microsoft.com/office/officeart/2005/8/layout/default"/>
-    <dgm:cxn modelId="{3CCF07C8-5F1D-4084-8216-42393FC5091F}" srcId="{00F3AAFD-C7F1-41DC-8C40-A6C89ECE87C0}" destId="{CE296EC6-1843-4B39-BCCB-6DBF4B15C5C8}" srcOrd="3" destOrd="0" parTransId="{F5DF28CD-7DFB-43D7-A735-FA2955AB7922}" sibTransId="{B06596B6-9AB1-42ED-82AC-27A4DA6D80CE}"/>
-    <dgm:cxn modelId="{75B51CD6-85F5-49EF-8B54-432189EB4409}" srcId="{00F3AAFD-C7F1-41DC-8C40-A6C89ECE87C0}" destId="{467C4D64-4502-44B4-B5E6-352619F92F37}" srcOrd="1" destOrd="0" parTransId="{783C9ABE-2C68-4167-86E3-AEAC88B12F50}" sibTransId="{D3302E66-77BF-4ADD-BE51-9389457F610A}"/>
     <dgm:cxn modelId="{6E75A2D9-B925-4A05-9182-C27D5472C51B}" srcId="{00F3AAFD-C7F1-41DC-8C40-A6C89ECE87C0}" destId="{4D17A255-17A4-4409-B0DE-2C989232B2E9}" srcOrd="0" destOrd="0" parTransId="{8D34B166-0B04-49FD-A373-3463EFC4F810}" sibTransId="{C99FA0AA-72DB-4826-B9E7-E65F28D01946}"/>
-    <dgm:cxn modelId="{A18F30E9-10DA-4E4E-B680-AB648604802B}" type="presOf" srcId="{ADDE1BC1-06C9-4BB0-82DB-3AF42F7E517E}" destId="{0316D1D0-8024-4D1D-AE4C-57BAF0749AC8}" srcOrd="0" destOrd="0" presId="urn:microsoft.com/office/officeart/2005/8/layout/default"/>
+    <dgm:cxn modelId="{E7AFA3E3-6188-4E45-BD83-57C5565A9A12}" type="presOf" srcId="{01A39ADB-F3CC-4135-8C3F-842E56BD0226}" destId="{9B7FDEC1-C852-40AD-9288-439B62C995B4}" srcOrd="0" destOrd="0" presId="urn:microsoft.com/office/officeart/2005/8/layout/default"/>
     <dgm:cxn modelId="{BA38B3BF-DD8A-4269-8512-A0E6C544B8B7}" type="presParOf" srcId="{18C69D56-AC6E-4A41-986D-C880BC21700A}" destId="{63849ED4-0E53-474A-99EB-BBA8BB2FE9AD}" srcOrd="0" destOrd="0" presId="urn:microsoft.com/office/officeart/2005/8/layout/default"/>
     <dgm:cxn modelId="{A5E59C67-F70B-41B4-9909-0A0E1C8F9A3D}" type="presParOf" srcId="{18C69D56-AC6E-4A41-986D-C880BC21700A}" destId="{6AE3DF16-1499-4799-8318-D25BAD70D710}" srcOrd="1" destOrd="0" presId="urn:microsoft.com/office/officeart/2005/8/layout/default"/>
-    <dgm:cxn modelId="{24188140-DFEA-43EC-A218-C35014A51FDE}" type="presParOf" srcId="{18C69D56-AC6E-4A41-986D-C880BC21700A}" destId="{A4256277-62EE-4890-9461-C9013E489523}" srcOrd="2" destOrd="0" presId="urn:microsoft.com/office/officeart/2005/8/layout/default"/>
-    <dgm:cxn modelId="{3669655A-3DAD-4E7E-915A-56602BA72624}" type="presParOf" srcId="{18C69D56-AC6E-4A41-986D-C880BC21700A}" destId="{CFE2C22B-4623-4A2E-BEA9-5C15A844B85C}" srcOrd="3" destOrd="0" presId="urn:microsoft.com/office/officeart/2005/8/layout/default"/>
-    <dgm:cxn modelId="{494C0F73-8119-4CE8-842F-839F05420806}" type="presParOf" srcId="{18C69D56-AC6E-4A41-986D-C880BC21700A}" destId="{0316D1D0-8024-4D1D-AE4C-57BAF0749AC8}" srcOrd="4" destOrd="0" presId="urn:microsoft.com/office/officeart/2005/8/layout/default"/>
-    <dgm:cxn modelId="{00984CC2-969F-4C09-83BF-B2B03692096C}" type="presParOf" srcId="{18C69D56-AC6E-4A41-986D-C880BC21700A}" destId="{5C17F4F4-9E6F-48E5-8BAF-F17E8A3D743C}" srcOrd="5" destOrd="0" presId="urn:microsoft.com/office/officeart/2005/8/layout/default"/>
-    <dgm:cxn modelId="{BF5D92B8-2781-4300-B8EC-2884CD179D48}" type="presParOf" srcId="{18C69D56-AC6E-4A41-986D-C880BC21700A}" destId="{6C9E2FAC-7F24-46A9-B5FC-2AE3E533DFF9}" srcOrd="6" destOrd="0" presId="urn:microsoft.com/office/officeart/2005/8/layout/default"/>
-    <dgm:cxn modelId="{FE38D14C-C803-4515-9DEE-961D6C93A1B9}" type="presParOf" srcId="{18C69D56-AC6E-4A41-986D-C880BC21700A}" destId="{CB3CD7B3-67B0-412B-BEC6-B03498149E0D}" srcOrd="7" destOrd="0" presId="urn:microsoft.com/office/officeart/2005/8/layout/default"/>
-    <dgm:cxn modelId="{1EED7B3D-A185-426B-97AD-04F5C01D7EAB}" type="presParOf" srcId="{18C69D56-AC6E-4A41-986D-C880BC21700A}" destId="{A8270942-746C-4EAA-8837-16EFE7FAFDE7}" srcOrd="8" destOrd="0" presId="urn:microsoft.com/office/officeart/2005/8/layout/default"/>
-    <dgm:cxn modelId="{8778DBD1-CF43-4F48-83B7-20AD938EC4B2}" type="presParOf" srcId="{18C69D56-AC6E-4A41-986D-C880BC21700A}" destId="{D38FD5E4-6D03-47FC-810F-4B106BD73689}" srcOrd="9" destOrd="0" presId="urn:microsoft.com/office/officeart/2005/8/layout/default"/>
-    <dgm:cxn modelId="{793E231F-BD31-4B0E-938F-BF2FC2A28C58}" type="presParOf" srcId="{18C69D56-AC6E-4A41-986D-C880BC21700A}" destId="{6FC5C050-4B6B-4C5E-AFC5-AACA9FC28393}" srcOrd="10" destOrd="0" presId="urn:microsoft.com/office/officeart/2005/8/layout/default"/>
+    <dgm:cxn modelId="{6CDF31F7-EAA5-47C8-A825-79DA9FCABFCB}" type="presParOf" srcId="{18C69D56-AC6E-4A41-986D-C880BC21700A}" destId="{67AE67B3-A238-48F2-8A36-DE8487384B01}" srcOrd="2" destOrd="0" presId="urn:microsoft.com/office/officeart/2005/8/layout/default"/>
+    <dgm:cxn modelId="{67A4D6C3-2F84-4DFD-8EF2-C00FED8D7387}" type="presParOf" srcId="{18C69D56-AC6E-4A41-986D-C880BC21700A}" destId="{B57A46B8-3808-45A7-8358-9C1786E9B61A}" srcOrd="3" destOrd="0" presId="urn:microsoft.com/office/officeart/2005/8/layout/default"/>
+    <dgm:cxn modelId="{6938D169-BDBA-48CE-97E6-AF9B49DD85EA}" type="presParOf" srcId="{18C69D56-AC6E-4A41-986D-C880BC21700A}" destId="{12235D26-346A-4F02-BA22-FBC4F3EDFF9C}" srcOrd="4" destOrd="0" presId="urn:microsoft.com/office/officeart/2005/8/layout/default"/>
+    <dgm:cxn modelId="{43F71422-80E5-4110-9D75-4D9A8C00AF59}" type="presParOf" srcId="{18C69D56-AC6E-4A41-986D-C880BC21700A}" destId="{40169D44-50EF-4A2B-BCE8-CE359A60E03D}" srcOrd="5" destOrd="0" presId="urn:microsoft.com/office/officeart/2005/8/layout/default"/>
+    <dgm:cxn modelId="{343808BD-DB2B-4BF9-A940-B51143F0E945}" type="presParOf" srcId="{18C69D56-AC6E-4A41-986D-C880BC21700A}" destId="{9B7FDEC1-C852-40AD-9288-439B62C995B4}" srcOrd="6" destOrd="0" presId="urn:microsoft.com/office/officeart/2005/8/layout/default"/>
+    <dgm:cxn modelId="{C9A373C6-D771-4090-A0FC-03ED70C6B5B7}" type="presParOf" srcId="{18C69D56-AC6E-4A41-986D-C880BC21700A}" destId="{965DBC06-2026-48F3-843D-AC42F47E2C88}" srcOrd="7" destOrd="0" presId="urn:microsoft.com/office/officeart/2005/8/layout/default"/>
+    <dgm:cxn modelId="{24A1E108-A5DD-4B53-A141-BCDAB1A0E347}" type="presParOf" srcId="{18C69D56-AC6E-4A41-986D-C880BC21700A}" destId="{A9CC1E8F-B0C3-4BE0-A70D-30F04DB17629}" srcOrd="8" destOrd="0" presId="urn:microsoft.com/office/officeart/2005/8/layout/default"/>
+    <dgm:cxn modelId="{FE62C889-86D3-4FE1-B072-EB3F8EF5790C}" type="presParOf" srcId="{18C69D56-AC6E-4A41-986D-C880BC21700A}" destId="{3EAD27B0-809C-4D7B-83F3-A710FCAE0364}" srcOrd="9" destOrd="0" presId="urn:microsoft.com/office/officeart/2005/8/layout/default"/>
+    <dgm:cxn modelId="{D19241E2-ED31-4A84-8F6A-597D30C72454}" type="presParOf" srcId="{18C69D56-AC6E-4A41-986D-C880BC21700A}" destId="{F37FC58E-235F-41FA-AB31-A387CAF2E6FA}" srcOrd="10" destOrd="0" presId="urn:microsoft.com/office/officeart/2005/8/layout/default"/>
   </dgm:cxnLst>
   <dgm:bg/>
   <dgm:whole/>
@@ -2051,7 +2839,7 @@
         <a:p>
           <a:r>
             <a:rPr lang="en-US" dirty="0"/>
-            <a:t>Login</a:t>
+            <a:t>Observer</a:t>
           </a:r>
         </a:p>
       </dgm:t>
@@ -2078,7 +2866,7 @@
         </a:p>
       </dgm:t>
     </dgm:pt>
-    <dgm:pt modelId="{467C4D64-4502-44B4-B5E6-352619F92F37}">
+    <dgm:pt modelId="{AB4937A8-6421-4C66-9447-13670CCABD21}">
       <dgm:prSet phldrT="[Text]"/>
       <dgm:spPr/>
       <dgm:t>
@@ -2087,12 +2875,12 @@
         <a:p>
           <a:r>
             <a:rPr lang="en-US" dirty="0"/>
-            <a:t>Set Pin</a:t>
+            <a:t>State</a:t>
           </a:r>
         </a:p>
       </dgm:t>
     </dgm:pt>
-    <dgm:pt modelId="{783C9ABE-2C68-4167-86E3-AEAC88B12F50}" type="parTrans" cxnId="{75B51CD6-85F5-49EF-8B54-432189EB4409}">
+    <dgm:pt modelId="{8AE919E6-8365-4479-A47F-9FB086D8E8E2}" type="parTrans" cxnId="{FB5CC789-D596-4B2B-917F-20C29B53F997}">
       <dgm:prSet/>
       <dgm:spPr/>
       <dgm:t>
@@ -2103,7 +2891,7 @@
         </a:p>
       </dgm:t>
     </dgm:pt>
-    <dgm:pt modelId="{D3302E66-77BF-4ADD-BE51-9389457F610A}" type="sibTrans" cxnId="{75B51CD6-85F5-49EF-8B54-432189EB4409}">
+    <dgm:pt modelId="{FD188FA1-652D-454F-B5F5-0008BE5503E6}" type="sibTrans" cxnId="{FB5CC789-D596-4B2B-917F-20C29B53F997}">
       <dgm:prSet/>
       <dgm:spPr/>
       <dgm:t>
@@ -2114,7 +2902,7 @@
         </a:p>
       </dgm:t>
     </dgm:pt>
-    <dgm:pt modelId="{ADDE1BC1-06C9-4BB0-82DB-3AF42F7E517E}">
+    <dgm:pt modelId="{4189810D-FA17-4DFA-8AEB-79689AEDD3D3}">
       <dgm:prSet phldrT="[Text]"/>
       <dgm:spPr/>
       <dgm:t>
@@ -2123,12 +2911,12 @@
         <a:p>
           <a:r>
             <a:rPr lang="en-US" dirty="0"/>
-            <a:t>My Card</a:t>
+            <a:t>Decorator</a:t>
           </a:r>
         </a:p>
       </dgm:t>
     </dgm:pt>
-    <dgm:pt modelId="{C7F8F7F6-9DBF-43D3-B01E-B7AD6C49FF7D}" type="parTrans" cxnId="{81E6742B-DAD0-4C8E-ADC6-739F34878206}">
+    <dgm:pt modelId="{CA8472BD-2D8B-4769-832A-DC1A70C33C3A}" type="parTrans" cxnId="{294873F0-BE0A-4528-AD89-C13487F91AEB}">
       <dgm:prSet/>
       <dgm:spPr/>
       <dgm:t>
@@ -2139,7 +2927,7 @@
         </a:p>
       </dgm:t>
     </dgm:pt>
-    <dgm:pt modelId="{12104CCB-A9CC-4F64-BA69-686C0E62FD31}" type="sibTrans" cxnId="{81E6742B-DAD0-4C8E-ADC6-739F34878206}">
+    <dgm:pt modelId="{B162D45F-BB5F-4240-B0B8-13BB012D56A8}" type="sibTrans" cxnId="{294873F0-BE0A-4528-AD89-C13487F91AEB}">
       <dgm:prSet/>
       <dgm:spPr/>
       <dgm:t>
@@ -2150,7 +2938,7 @@
         </a:p>
       </dgm:t>
     </dgm:pt>
-    <dgm:pt modelId="{CE296EC6-1843-4B39-BCCB-6DBF4B15C5C8}">
+    <dgm:pt modelId="{B838BAC8-7330-46F8-9702-0E475CF3D220}">
       <dgm:prSet phldrT="[Text]"/>
       <dgm:spPr/>
       <dgm:t>
@@ -2159,12 +2947,12 @@
         <a:p>
           <a:r>
             <a:rPr lang="en-US" dirty="0"/>
-            <a:t>Add Card</a:t>
+            <a:t>Strategy</a:t>
           </a:r>
         </a:p>
       </dgm:t>
     </dgm:pt>
-    <dgm:pt modelId="{F5DF28CD-7DFB-43D7-A735-FA2955AB7922}" type="parTrans" cxnId="{3CCF07C8-5F1D-4084-8216-42393FC5091F}">
+    <dgm:pt modelId="{9E9221C8-83E6-4075-9E9C-DAFD320B73AC}" type="parTrans" cxnId="{C0DC5CC5-3BB6-43EF-AE42-5E34DEB4E8FA}">
       <dgm:prSet/>
       <dgm:spPr/>
       <dgm:t>
@@ -2175,7 +2963,7 @@
         </a:p>
       </dgm:t>
     </dgm:pt>
-    <dgm:pt modelId="{B06596B6-9AB1-42ED-82AC-27A4DA6D80CE}" type="sibTrans" cxnId="{3CCF07C8-5F1D-4084-8216-42393FC5091F}">
+    <dgm:pt modelId="{8D02D274-1FD0-4845-9271-E648C0233652}" type="sibTrans" cxnId="{C0DC5CC5-3BB6-43EF-AE42-5E34DEB4E8FA}">
       <dgm:prSet/>
       <dgm:spPr/>
       <dgm:t>
@@ -2186,7 +2974,7 @@
         </a:p>
       </dgm:t>
     </dgm:pt>
-    <dgm:pt modelId="{34FC4429-DB6E-4657-99E3-33BE71C4A037}">
+    <dgm:pt modelId="{69A1FDF3-D504-4BE4-B5C1-1A210E62FEF2}">
       <dgm:prSet phldrT="[Text]"/>
       <dgm:spPr/>
       <dgm:t>
@@ -2195,12 +2983,12 @@
         <a:p>
           <a:r>
             <a:rPr lang="en-US" dirty="0"/>
-            <a:t>Order</a:t>
+            <a:t>Command</a:t>
           </a:r>
         </a:p>
       </dgm:t>
     </dgm:pt>
-    <dgm:pt modelId="{BE619BE5-B4B3-4953-A656-BC0A2014BCDE}" type="parTrans" cxnId="{ACCF2763-61E2-4EAD-9977-83F0F37FC7C6}">
+    <dgm:pt modelId="{C467CF6D-0D03-4FCB-9730-A790A2DCA3EC}" type="parTrans" cxnId="{63C9A92D-0225-4AF2-84EB-A5DF394EF8AF}">
       <dgm:prSet/>
       <dgm:spPr/>
       <dgm:t>
@@ -2211,7 +2999,7 @@
         </a:p>
       </dgm:t>
     </dgm:pt>
-    <dgm:pt modelId="{381DBD94-B9FB-4E0F-9A60-3C7FF4C900F6}" type="sibTrans" cxnId="{ACCF2763-61E2-4EAD-9977-83F0F37FC7C6}">
+    <dgm:pt modelId="{12845F06-07FD-4630-B402-5D297D3019F6}" type="sibTrans" cxnId="{63C9A92D-0225-4AF2-84EB-A5DF394EF8AF}">
       <dgm:prSet/>
       <dgm:spPr/>
       <dgm:t>
@@ -2222,7 +3010,7 @@
         </a:p>
       </dgm:t>
     </dgm:pt>
-    <dgm:pt modelId="{FE715415-56E1-4B1D-9462-0A89B5669D9F}">
+    <dgm:pt modelId="{09B4E4A2-738B-4921-88A7-8A13CF27A215}">
       <dgm:prSet phldrT="[Text]"/>
       <dgm:spPr/>
       <dgm:t>
@@ -2231,12 +3019,12 @@
         <a:p>
           <a:r>
             <a:rPr lang="en-US" dirty="0"/>
-            <a:t>Pay</a:t>
+            <a:t>Visitor</a:t>
           </a:r>
         </a:p>
       </dgm:t>
     </dgm:pt>
-    <dgm:pt modelId="{36FC3FBC-E9B9-410C-ACAE-6CCF07886911}" type="parTrans" cxnId="{AAA0E928-F521-4469-9D25-AD9C9758F45F}">
+    <dgm:pt modelId="{21119C1B-AE02-4AB9-AB7F-FA7D48135837}" type="parTrans" cxnId="{D9F57E18-528E-428E-8E66-1925AFF834EE}">
       <dgm:prSet/>
       <dgm:spPr/>
       <dgm:t>
@@ -2247,7 +3035,7 @@
         </a:p>
       </dgm:t>
     </dgm:pt>
-    <dgm:pt modelId="{FBD20F4A-D130-4A28-951E-F510AE3C16F6}" type="sibTrans" cxnId="{AAA0E928-F521-4469-9D25-AD9C9758F45F}">
+    <dgm:pt modelId="{60AC1052-BC0E-4A79-9820-69860C079F14}" type="sibTrans" cxnId="{D9F57E18-528E-428E-8E66-1925AFF834EE}">
       <dgm:prSet/>
       <dgm:spPr/>
       <dgm:t>
@@ -2279,56 +3067,56 @@
       <dgm:prSet presAssocID="{C99FA0AA-72DB-4826-B9E7-E65F28D01946}" presName="sibTrans" presStyleCnt="0"/>
       <dgm:spPr/>
     </dgm:pt>
-    <dgm:pt modelId="{A4256277-62EE-4890-9461-C9013E489523}" type="pres">
-      <dgm:prSet presAssocID="{467C4D64-4502-44B4-B5E6-352619F92F37}" presName="node" presStyleLbl="node1" presStyleIdx="1" presStyleCnt="6">
+    <dgm:pt modelId="{F650E8E9-20EF-4BF0-9D81-96ABE11EBDA4}" type="pres">
+      <dgm:prSet presAssocID="{AB4937A8-6421-4C66-9447-13670CCABD21}" presName="node" presStyleLbl="node1" presStyleIdx="1" presStyleCnt="6">
         <dgm:presLayoutVars>
           <dgm:bulletEnabled val="1"/>
         </dgm:presLayoutVars>
       </dgm:prSet>
       <dgm:spPr/>
     </dgm:pt>
-    <dgm:pt modelId="{CFE2C22B-4623-4A2E-BEA9-5C15A844B85C}" type="pres">
-      <dgm:prSet presAssocID="{D3302E66-77BF-4ADD-BE51-9389457F610A}" presName="sibTrans" presStyleCnt="0"/>
+    <dgm:pt modelId="{997F5785-5F45-4967-949F-212EA4F21675}" type="pres">
+      <dgm:prSet presAssocID="{FD188FA1-652D-454F-B5F5-0008BE5503E6}" presName="sibTrans" presStyleCnt="0"/>
       <dgm:spPr/>
     </dgm:pt>
-    <dgm:pt modelId="{0316D1D0-8024-4D1D-AE4C-57BAF0749AC8}" type="pres">
-      <dgm:prSet presAssocID="{ADDE1BC1-06C9-4BB0-82DB-3AF42F7E517E}" presName="node" presStyleLbl="node1" presStyleIdx="2" presStyleCnt="6">
+    <dgm:pt modelId="{902036ED-F45D-414E-A39B-87C1341A555A}" type="pres">
+      <dgm:prSet presAssocID="{4189810D-FA17-4DFA-8AEB-79689AEDD3D3}" presName="node" presStyleLbl="node1" presStyleIdx="2" presStyleCnt="6">
         <dgm:presLayoutVars>
           <dgm:bulletEnabled val="1"/>
         </dgm:presLayoutVars>
       </dgm:prSet>
       <dgm:spPr/>
     </dgm:pt>
-    <dgm:pt modelId="{5C17F4F4-9E6F-48E5-8BAF-F17E8A3D743C}" type="pres">
-      <dgm:prSet presAssocID="{12104CCB-A9CC-4F64-BA69-686C0E62FD31}" presName="sibTrans" presStyleCnt="0"/>
+    <dgm:pt modelId="{21ABAF70-FA8D-4894-A3AA-BE3AEDE7D869}" type="pres">
+      <dgm:prSet presAssocID="{B162D45F-BB5F-4240-B0B8-13BB012D56A8}" presName="sibTrans" presStyleCnt="0"/>
       <dgm:spPr/>
     </dgm:pt>
-    <dgm:pt modelId="{6C9E2FAC-7F24-46A9-B5FC-2AE3E533DFF9}" type="pres">
-      <dgm:prSet presAssocID="{CE296EC6-1843-4B39-BCCB-6DBF4B15C5C8}" presName="node" presStyleLbl="node1" presStyleIdx="3" presStyleCnt="6">
+    <dgm:pt modelId="{665A54DB-3AD4-4FDD-9158-54C311F7024B}" type="pres">
+      <dgm:prSet presAssocID="{B838BAC8-7330-46F8-9702-0E475CF3D220}" presName="node" presStyleLbl="node1" presStyleIdx="3" presStyleCnt="6">
         <dgm:presLayoutVars>
           <dgm:bulletEnabled val="1"/>
         </dgm:presLayoutVars>
       </dgm:prSet>
       <dgm:spPr/>
     </dgm:pt>
-    <dgm:pt modelId="{CB3CD7B3-67B0-412B-BEC6-B03498149E0D}" type="pres">
-      <dgm:prSet presAssocID="{B06596B6-9AB1-42ED-82AC-27A4DA6D80CE}" presName="sibTrans" presStyleCnt="0"/>
+    <dgm:pt modelId="{F486D724-0299-450A-8F81-390844A6DBAE}" type="pres">
+      <dgm:prSet presAssocID="{8D02D274-1FD0-4845-9271-E648C0233652}" presName="sibTrans" presStyleCnt="0"/>
       <dgm:spPr/>
     </dgm:pt>
-    <dgm:pt modelId="{A8270942-746C-4EAA-8837-16EFE7FAFDE7}" type="pres">
-      <dgm:prSet presAssocID="{34FC4429-DB6E-4657-99E3-33BE71C4A037}" presName="node" presStyleLbl="node1" presStyleIdx="4" presStyleCnt="6">
+    <dgm:pt modelId="{593180D3-1AFA-4D8A-82F5-A33D5B0CA155}" type="pres">
+      <dgm:prSet presAssocID="{69A1FDF3-D504-4BE4-B5C1-1A210E62FEF2}" presName="node" presStyleLbl="node1" presStyleIdx="4" presStyleCnt="6">
         <dgm:presLayoutVars>
           <dgm:bulletEnabled val="1"/>
         </dgm:presLayoutVars>
       </dgm:prSet>
       <dgm:spPr/>
     </dgm:pt>
-    <dgm:pt modelId="{D38FD5E4-6D03-47FC-810F-4B106BD73689}" type="pres">
-      <dgm:prSet presAssocID="{381DBD94-B9FB-4E0F-9A60-3C7FF4C900F6}" presName="sibTrans" presStyleCnt="0"/>
+    <dgm:pt modelId="{D164AAAA-BC10-45CC-89EF-55F3B83B58B7}" type="pres">
+      <dgm:prSet presAssocID="{12845F06-07FD-4630-B402-5D297D3019F6}" presName="sibTrans" presStyleCnt="0"/>
       <dgm:spPr/>
     </dgm:pt>
-    <dgm:pt modelId="{6FC5C050-4B6B-4C5E-AFC5-AACA9FC28393}" type="pres">
-      <dgm:prSet presAssocID="{FE715415-56E1-4B1D-9462-0A89B5669D9F}" presName="node" presStyleLbl="node1" presStyleIdx="5" presStyleCnt="6">
+    <dgm:pt modelId="{9760A73F-DE10-4741-9E51-CC1400856F7F}" type="pres">
+      <dgm:prSet presAssocID="{09B4E4A2-738B-4921-88A7-8A13CF27A215}" presName="node" presStyleLbl="node1" presStyleIdx="5" presStyleCnt="6">
         <dgm:presLayoutVars>
           <dgm:bulletEnabled val="1"/>
         </dgm:presLayoutVars>
@@ -2337,36 +3125,120 @@
     </dgm:pt>
   </dgm:ptLst>
   <dgm:cxnLst>
-    <dgm:cxn modelId="{AAA0E928-F521-4469-9D25-AD9C9758F45F}" srcId="{00F3AAFD-C7F1-41DC-8C40-A6C89ECE87C0}" destId="{FE715415-56E1-4B1D-9462-0A89B5669D9F}" srcOrd="5" destOrd="0" parTransId="{36FC3FBC-E9B9-410C-ACAE-6CCF07886911}" sibTransId="{FBD20F4A-D130-4A28-951E-F510AE3C16F6}"/>
-    <dgm:cxn modelId="{81E6742B-DAD0-4C8E-ADC6-739F34878206}" srcId="{00F3AAFD-C7F1-41DC-8C40-A6C89ECE87C0}" destId="{ADDE1BC1-06C9-4BB0-82DB-3AF42F7E517E}" srcOrd="2" destOrd="0" parTransId="{C7F8F7F6-9DBF-43D3-B01E-B7AD6C49FF7D}" sibTransId="{12104CCB-A9CC-4F64-BA69-686C0E62FD31}"/>
-    <dgm:cxn modelId="{1CE04236-4339-48CA-869F-8B33DAFE06D9}" type="presOf" srcId="{467C4D64-4502-44B4-B5E6-352619F92F37}" destId="{A4256277-62EE-4890-9461-C9013E489523}" srcOrd="0" destOrd="0" presId="urn:microsoft.com/office/officeart/2005/8/layout/default"/>
+    <dgm:cxn modelId="{D9F57E18-528E-428E-8E66-1925AFF834EE}" srcId="{00F3AAFD-C7F1-41DC-8C40-A6C89ECE87C0}" destId="{09B4E4A2-738B-4921-88A7-8A13CF27A215}" srcOrd="5" destOrd="0" parTransId="{21119C1B-AE02-4AB9-AB7F-FA7D48135837}" sibTransId="{60AC1052-BC0E-4A79-9820-69860C079F14}"/>
+    <dgm:cxn modelId="{15C1CD1F-CFCF-4C28-AFF2-EC94CFBC3179}" type="presOf" srcId="{09B4E4A2-738B-4921-88A7-8A13CF27A215}" destId="{9760A73F-DE10-4741-9E51-CC1400856F7F}" srcOrd="0" destOrd="0" presId="urn:microsoft.com/office/officeart/2005/8/layout/default"/>
+    <dgm:cxn modelId="{63C9A92D-0225-4AF2-84EB-A5DF394EF8AF}" srcId="{00F3AAFD-C7F1-41DC-8C40-A6C89ECE87C0}" destId="{69A1FDF3-D504-4BE4-B5C1-1A210E62FEF2}" srcOrd="4" destOrd="0" parTransId="{C467CF6D-0D03-4FCB-9730-A790A2DCA3EC}" sibTransId="{12845F06-07FD-4630-B402-5D297D3019F6}"/>
+    <dgm:cxn modelId="{2C78A939-23E3-4EDD-A09C-E6F2912D8E4C}" type="presOf" srcId="{69A1FDF3-D504-4BE4-B5C1-1A210E62FEF2}" destId="{593180D3-1AFA-4D8A-82F5-A33D5B0CA155}" srcOrd="0" destOrd="0" presId="urn:microsoft.com/office/officeart/2005/8/layout/default"/>
     <dgm:cxn modelId="{97B47E3F-5360-4BDE-BCC1-F304F86881AE}" type="presOf" srcId="{4D17A255-17A4-4409-B0DE-2C989232B2E9}" destId="{63849ED4-0E53-474A-99EB-BBA8BB2FE9AD}" srcOrd="0" destOrd="0" presId="urn:microsoft.com/office/officeart/2005/8/layout/default"/>
-    <dgm:cxn modelId="{ACCF2763-61E2-4EAD-9977-83F0F37FC7C6}" srcId="{00F3AAFD-C7F1-41DC-8C40-A6C89ECE87C0}" destId="{34FC4429-DB6E-4657-99E3-33BE71C4A037}" srcOrd="4" destOrd="0" parTransId="{BE619BE5-B4B3-4953-A656-BC0A2014BCDE}" sibTransId="{381DBD94-B9FB-4E0F-9A60-3C7FF4C900F6}"/>
-    <dgm:cxn modelId="{2F4AF063-3D86-4B32-8BDF-768EFB63DF23}" type="presOf" srcId="{FE715415-56E1-4B1D-9462-0A89B5669D9F}" destId="{6FC5C050-4B6B-4C5E-AFC5-AACA9FC28393}" srcOrd="0" destOrd="0" presId="urn:microsoft.com/office/officeart/2005/8/layout/default"/>
-    <dgm:cxn modelId="{E6A7AC95-263B-4881-8259-266447261BBB}" type="presOf" srcId="{CE296EC6-1843-4B39-BCCB-6DBF4B15C5C8}" destId="{6C9E2FAC-7F24-46A9-B5FC-2AE3E533DFF9}" srcOrd="0" destOrd="0" presId="urn:microsoft.com/office/officeart/2005/8/layout/default"/>
+    <dgm:cxn modelId="{FB5CC789-D596-4B2B-917F-20C29B53F997}" srcId="{00F3AAFD-C7F1-41DC-8C40-A6C89ECE87C0}" destId="{AB4937A8-6421-4C66-9447-13670CCABD21}" srcOrd="1" destOrd="0" parTransId="{8AE919E6-8365-4479-A47F-9FB086D8E8E2}" sibTransId="{FD188FA1-652D-454F-B5F5-0008BE5503E6}"/>
+    <dgm:cxn modelId="{43186396-8699-4A04-A047-8DAA70C8E4CB}" type="presOf" srcId="{B838BAC8-7330-46F8-9702-0E475CF3D220}" destId="{665A54DB-3AD4-4FDD-9158-54C311F7024B}" srcOrd="0" destOrd="0" presId="urn:microsoft.com/office/officeart/2005/8/layout/default"/>
     <dgm:cxn modelId="{361173BB-CAC7-4D05-A2D7-522D165390C4}" type="presOf" srcId="{00F3AAFD-C7F1-41DC-8C40-A6C89ECE87C0}" destId="{18C69D56-AC6E-4A41-986D-C880BC21700A}" srcOrd="0" destOrd="0" presId="urn:microsoft.com/office/officeart/2005/8/layout/default"/>
-    <dgm:cxn modelId="{28802CC7-29CA-4512-B476-7C031891F6C6}" type="presOf" srcId="{34FC4429-DB6E-4657-99E3-33BE71C4A037}" destId="{A8270942-746C-4EAA-8837-16EFE7FAFDE7}" srcOrd="0" destOrd="0" presId="urn:microsoft.com/office/officeart/2005/8/layout/default"/>
-    <dgm:cxn modelId="{3CCF07C8-5F1D-4084-8216-42393FC5091F}" srcId="{00F3AAFD-C7F1-41DC-8C40-A6C89ECE87C0}" destId="{CE296EC6-1843-4B39-BCCB-6DBF4B15C5C8}" srcOrd="3" destOrd="0" parTransId="{F5DF28CD-7DFB-43D7-A735-FA2955AB7922}" sibTransId="{B06596B6-9AB1-42ED-82AC-27A4DA6D80CE}"/>
-    <dgm:cxn modelId="{75B51CD6-85F5-49EF-8B54-432189EB4409}" srcId="{00F3AAFD-C7F1-41DC-8C40-A6C89ECE87C0}" destId="{467C4D64-4502-44B4-B5E6-352619F92F37}" srcOrd="1" destOrd="0" parTransId="{783C9ABE-2C68-4167-86E3-AEAC88B12F50}" sibTransId="{D3302E66-77BF-4ADD-BE51-9389457F610A}"/>
+    <dgm:cxn modelId="{C0DC5CC5-3BB6-43EF-AE42-5E34DEB4E8FA}" srcId="{00F3AAFD-C7F1-41DC-8C40-A6C89ECE87C0}" destId="{B838BAC8-7330-46F8-9702-0E475CF3D220}" srcOrd="3" destOrd="0" parTransId="{9E9221C8-83E6-4075-9E9C-DAFD320B73AC}" sibTransId="{8D02D274-1FD0-4845-9271-E648C0233652}"/>
+    <dgm:cxn modelId="{2E540AD7-6166-4676-A7CF-8C4A04F30EBD}" type="presOf" srcId="{AB4937A8-6421-4C66-9447-13670CCABD21}" destId="{F650E8E9-20EF-4BF0-9D81-96ABE11EBDA4}" srcOrd="0" destOrd="0" presId="urn:microsoft.com/office/officeart/2005/8/layout/default"/>
     <dgm:cxn modelId="{6E75A2D9-B925-4A05-9182-C27D5472C51B}" srcId="{00F3AAFD-C7F1-41DC-8C40-A6C89ECE87C0}" destId="{4D17A255-17A4-4409-B0DE-2C989232B2E9}" srcOrd="0" destOrd="0" parTransId="{8D34B166-0B04-49FD-A373-3463EFC4F810}" sibTransId="{C99FA0AA-72DB-4826-B9E7-E65F28D01946}"/>
-    <dgm:cxn modelId="{A18F30E9-10DA-4E4E-B680-AB648604802B}" type="presOf" srcId="{ADDE1BC1-06C9-4BB0-82DB-3AF42F7E517E}" destId="{0316D1D0-8024-4D1D-AE4C-57BAF0749AC8}" srcOrd="0" destOrd="0" presId="urn:microsoft.com/office/officeart/2005/8/layout/default"/>
+    <dgm:cxn modelId="{ADF78FE1-5165-4301-ABE0-016CC02479BD}" type="presOf" srcId="{4189810D-FA17-4DFA-8AEB-79689AEDD3D3}" destId="{902036ED-F45D-414E-A39B-87C1341A555A}" srcOrd="0" destOrd="0" presId="urn:microsoft.com/office/officeart/2005/8/layout/default"/>
+    <dgm:cxn modelId="{294873F0-BE0A-4528-AD89-C13487F91AEB}" srcId="{00F3AAFD-C7F1-41DC-8C40-A6C89ECE87C0}" destId="{4189810D-FA17-4DFA-8AEB-79689AEDD3D3}" srcOrd="2" destOrd="0" parTransId="{CA8472BD-2D8B-4769-832A-DC1A70C33C3A}" sibTransId="{B162D45F-BB5F-4240-B0B8-13BB012D56A8}"/>
     <dgm:cxn modelId="{BA38B3BF-DD8A-4269-8512-A0E6C544B8B7}" type="presParOf" srcId="{18C69D56-AC6E-4A41-986D-C880BC21700A}" destId="{63849ED4-0E53-474A-99EB-BBA8BB2FE9AD}" srcOrd="0" destOrd="0" presId="urn:microsoft.com/office/officeart/2005/8/layout/default"/>
     <dgm:cxn modelId="{A5E59C67-F70B-41B4-9909-0A0E1C8F9A3D}" type="presParOf" srcId="{18C69D56-AC6E-4A41-986D-C880BC21700A}" destId="{6AE3DF16-1499-4799-8318-D25BAD70D710}" srcOrd="1" destOrd="0" presId="urn:microsoft.com/office/officeart/2005/8/layout/default"/>
-    <dgm:cxn modelId="{24188140-DFEA-43EC-A218-C35014A51FDE}" type="presParOf" srcId="{18C69D56-AC6E-4A41-986D-C880BC21700A}" destId="{A4256277-62EE-4890-9461-C9013E489523}" srcOrd="2" destOrd="0" presId="urn:microsoft.com/office/officeart/2005/8/layout/default"/>
-    <dgm:cxn modelId="{3669655A-3DAD-4E7E-915A-56602BA72624}" type="presParOf" srcId="{18C69D56-AC6E-4A41-986D-C880BC21700A}" destId="{CFE2C22B-4623-4A2E-BEA9-5C15A844B85C}" srcOrd="3" destOrd="0" presId="urn:microsoft.com/office/officeart/2005/8/layout/default"/>
-    <dgm:cxn modelId="{494C0F73-8119-4CE8-842F-839F05420806}" type="presParOf" srcId="{18C69D56-AC6E-4A41-986D-C880BC21700A}" destId="{0316D1D0-8024-4D1D-AE4C-57BAF0749AC8}" srcOrd="4" destOrd="0" presId="urn:microsoft.com/office/officeart/2005/8/layout/default"/>
-    <dgm:cxn modelId="{00984CC2-969F-4C09-83BF-B2B03692096C}" type="presParOf" srcId="{18C69D56-AC6E-4A41-986D-C880BC21700A}" destId="{5C17F4F4-9E6F-48E5-8BAF-F17E8A3D743C}" srcOrd="5" destOrd="0" presId="urn:microsoft.com/office/officeart/2005/8/layout/default"/>
-    <dgm:cxn modelId="{BF5D92B8-2781-4300-B8EC-2884CD179D48}" type="presParOf" srcId="{18C69D56-AC6E-4A41-986D-C880BC21700A}" destId="{6C9E2FAC-7F24-46A9-B5FC-2AE3E533DFF9}" srcOrd="6" destOrd="0" presId="urn:microsoft.com/office/officeart/2005/8/layout/default"/>
-    <dgm:cxn modelId="{FE38D14C-C803-4515-9DEE-961D6C93A1B9}" type="presParOf" srcId="{18C69D56-AC6E-4A41-986D-C880BC21700A}" destId="{CB3CD7B3-67B0-412B-BEC6-B03498149E0D}" srcOrd="7" destOrd="0" presId="urn:microsoft.com/office/officeart/2005/8/layout/default"/>
-    <dgm:cxn modelId="{1EED7B3D-A185-426B-97AD-04F5C01D7EAB}" type="presParOf" srcId="{18C69D56-AC6E-4A41-986D-C880BC21700A}" destId="{A8270942-746C-4EAA-8837-16EFE7FAFDE7}" srcOrd="8" destOrd="0" presId="urn:microsoft.com/office/officeart/2005/8/layout/default"/>
-    <dgm:cxn modelId="{8778DBD1-CF43-4F48-83B7-20AD938EC4B2}" type="presParOf" srcId="{18C69D56-AC6E-4A41-986D-C880BC21700A}" destId="{D38FD5E4-6D03-47FC-810F-4B106BD73689}" srcOrd="9" destOrd="0" presId="urn:microsoft.com/office/officeart/2005/8/layout/default"/>
-    <dgm:cxn modelId="{793E231F-BD31-4B0E-938F-BF2FC2A28C58}" type="presParOf" srcId="{18C69D56-AC6E-4A41-986D-C880BC21700A}" destId="{6FC5C050-4B6B-4C5E-AFC5-AACA9FC28393}" srcOrd="10" destOrd="0" presId="urn:microsoft.com/office/officeart/2005/8/layout/default"/>
+    <dgm:cxn modelId="{2E975D72-5E15-46E9-8551-A87FED6245AF}" type="presParOf" srcId="{18C69D56-AC6E-4A41-986D-C880BC21700A}" destId="{F650E8E9-20EF-4BF0-9D81-96ABE11EBDA4}" srcOrd="2" destOrd="0" presId="urn:microsoft.com/office/officeart/2005/8/layout/default"/>
+    <dgm:cxn modelId="{AFB47D9C-27EB-4868-8F5C-2C5AC2789670}" type="presParOf" srcId="{18C69D56-AC6E-4A41-986D-C880BC21700A}" destId="{997F5785-5F45-4967-949F-212EA4F21675}" srcOrd="3" destOrd="0" presId="urn:microsoft.com/office/officeart/2005/8/layout/default"/>
+    <dgm:cxn modelId="{5C534A78-4A91-4A16-AD78-41F902866B48}" type="presParOf" srcId="{18C69D56-AC6E-4A41-986D-C880BC21700A}" destId="{902036ED-F45D-414E-A39B-87C1341A555A}" srcOrd="4" destOrd="0" presId="urn:microsoft.com/office/officeart/2005/8/layout/default"/>
+    <dgm:cxn modelId="{83852E89-4E45-4B6A-97BF-477014B4E638}" type="presParOf" srcId="{18C69D56-AC6E-4A41-986D-C880BC21700A}" destId="{21ABAF70-FA8D-4894-A3AA-BE3AEDE7D869}" srcOrd="5" destOrd="0" presId="urn:microsoft.com/office/officeart/2005/8/layout/default"/>
+    <dgm:cxn modelId="{BA774B02-7879-4B17-B738-A8D44FDFED27}" type="presParOf" srcId="{18C69D56-AC6E-4A41-986D-C880BC21700A}" destId="{665A54DB-3AD4-4FDD-9158-54C311F7024B}" srcOrd="6" destOrd="0" presId="urn:microsoft.com/office/officeart/2005/8/layout/default"/>
+    <dgm:cxn modelId="{EC9B63AD-676D-4157-B70C-6D3AAA4E4483}" type="presParOf" srcId="{18C69D56-AC6E-4A41-986D-C880BC21700A}" destId="{F486D724-0299-450A-8F81-390844A6DBAE}" srcOrd="7" destOrd="0" presId="urn:microsoft.com/office/officeart/2005/8/layout/default"/>
+    <dgm:cxn modelId="{DC6D419C-6F20-4A7F-B9B6-B0AE77531168}" type="presParOf" srcId="{18C69D56-AC6E-4A41-986D-C880BC21700A}" destId="{593180D3-1AFA-4D8A-82F5-A33D5B0CA155}" srcOrd="8" destOrd="0" presId="urn:microsoft.com/office/officeart/2005/8/layout/default"/>
+    <dgm:cxn modelId="{65B88A88-11E4-43B5-87C3-300FAEAA6DE8}" type="presParOf" srcId="{18C69D56-AC6E-4A41-986D-C880BC21700A}" destId="{D164AAAA-BC10-45CC-89EF-55F3B83B58B7}" srcOrd="9" destOrd="0" presId="urn:microsoft.com/office/officeart/2005/8/layout/default"/>
+    <dgm:cxn modelId="{A232DAE7-52AE-4AFA-A094-8B1D3AD241F3}" type="presParOf" srcId="{18C69D56-AC6E-4A41-986D-C880BC21700A}" destId="{9760A73F-DE10-4741-9E51-CC1400856F7F}" srcOrd="10" destOrd="0" presId="urn:microsoft.com/office/officeart/2005/8/layout/default"/>
   </dgm:cxnLst>
   <dgm:bg/>
   <dgm:whole/>
   <dgm:extLst>
     <a:ext uri="http://schemas.microsoft.com/office/drawing/2008/diagram">
       <dsp:dataModelExt xmlns:dsp="http://schemas.microsoft.com/office/drawing/2008/diagram" relId="rId7" minVer="http://schemas.openxmlformats.org/drawingml/2006/diagram"/>
+    </a:ext>
+  </dgm:extLst>
+</dgm:dataModel>
+</file>
+
+<file path=ppt/diagrams/data3.xml><?xml version="1.0" encoding="utf-8"?>
+<dgm:dataModel xmlns:dgm="http://schemas.openxmlformats.org/drawingml/2006/diagram" xmlns:a="http://schemas.openxmlformats.org/drawingml/2006/main">
+  <dgm:ptLst>
+    <dgm:pt modelId="{00F3AAFD-C7F1-41DC-8C40-A6C89ECE87C0}" type="doc">
+      <dgm:prSet loTypeId="urn:microsoft.com/office/officeart/2005/8/layout/default" loCatId="list" qsTypeId="urn:microsoft.com/office/officeart/2005/8/quickstyle/simple1" qsCatId="simple" csTypeId="urn:microsoft.com/office/officeart/2005/8/colors/colorful2" csCatId="colorful" phldr="1"/>
+      <dgm:spPr/>
+      <dgm:t>
+        <a:bodyPr/>
+        <a:lstStyle/>
+        <a:p>
+          <a:endParaRPr lang="en-US"/>
+        </a:p>
+      </dgm:t>
+    </dgm:pt>
+    <dgm:pt modelId="{4D17A255-17A4-4409-B0DE-2C989232B2E9}">
+      <dgm:prSet phldrT="[Text]"/>
+      <dgm:spPr/>
+      <dgm:t>
+        <a:bodyPr/>
+        <a:lstStyle/>
+        <a:p>
+          <a:r>
+            <a:rPr lang="en-US" dirty="0"/>
+            <a:t>Observer</a:t>
+          </a:r>
+        </a:p>
+      </dgm:t>
+    </dgm:pt>
+    <dgm:pt modelId="{8D34B166-0B04-49FD-A373-3463EFC4F810}" type="parTrans" cxnId="{6E75A2D9-B925-4A05-9182-C27D5472C51B}">
+      <dgm:prSet/>
+      <dgm:spPr/>
+      <dgm:t>
+        <a:bodyPr/>
+        <a:lstStyle/>
+        <a:p>
+          <a:endParaRPr lang="en-US"/>
+        </a:p>
+      </dgm:t>
+    </dgm:pt>
+    <dgm:pt modelId="{C99FA0AA-72DB-4826-B9E7-E65F28D01946}" type="sibTrans" cxnId="{6E75A2D9-B925-4A05-9182-C27D5472C51B}">
+      <dgm:prSet/>
+      <dgm:spPr/>
+      <dgm:t>
+        <a:bodyPr/>
+        <a:lstStyle/>
+        <a:p>
+          <a:endParaRPr lang="en-US"/>
+        </a:p>
+      </dgm:t>
+    </dgm:pt>
+    <dgm:pt modelId="{18C69D56-AC6E-4A41-986D-C880BC21700A}" type="pres">
+      <dgm:prSet presAssocID="{00F3AAFD-C7F1-41DC-8C40-A6C89ECE87C0}" presName="diagram" presStyleCnt="0">
+        <dgm:presLayoutVars>
+          <dgm:dir/>
+          <dgm:resizeHandles val="exact"/>
+        </dgm:presLayoutVars>
+      </dgm:prSet>
+      <dgm:spPr/>
+    </dgm:pt>
+    <dgm:pt modelId="{63849ED4-0E53-474A-99EB-BBA8BB2FE9AD}" type="pres">
+      <dgm:prSet presAssocID="{4D17A255-17A4-4409-B0DE-2C989232B2E9}" presName="node" presStyleLbl="node1" presStyleIdx="0" presStyleCnt="1" custLinFactNeighborX="-20120" custLinFactNeighborY="37715">
+        <dgm:presLayoutVars>
+          <dgm:bulletEnabled val="1"/>
+        </dgm:presLayoutVars>
+      </dgm:prSet>
+      <dgm:spPr/>
+    </dgm:pt>
+  </dgm:ptLst>
+  <dgm:cxnLst>
+    <dgm:cxn modelId="{97B47E3F-5360-4BDE-BCC1-F304F86881AE}" type="presOf" srcId="{4D17A255-17A4-4409-B0DE-2C989232B2E9}" destId="{63849ED4-0E53-474A-99EB-BBA8BB2FE9AD}" srcOrd="0" destOrd="0" presId="urn:microsoft.com/office/officeart/2005/8/layout/default"/>
+    <dgm:cxn modelId="{361173BB-CAC7-4D05-A2D7-522D165390C4}" type="presOf" srcId="{00F3AAFD-C7F1-41DC-8C40-A6C89ECE87C0}" destId="{18C69D56-AC6E-4A41-986D-C880BC21700A}" srcOrd="0" destOrd="0" presId="urn:microsoft.com/office/officeart/2005/8/layout/default"/>
+    <dgm:cxn modelId="{6E75A2D9-B925-4A05-9182-C27D5472C51B}" srcId="{00F3AAFD-C7F1-41DC-8C40-A6C89ECE87C0}" destId="{4D17A255-17A4-4409-B0DE-2C989232B2E9}" srcOrd="0" destOrd="0" parTransId="{8D34B166-0B04-49FD-A373-3463EFC4F810}" sibTransId="{C99FA0AA-72DB-4826-B9E7-E65F28D01946}"/>
+    <dgm:cxn modelId="{BA38B3BF-DD8A-4269-8512-A0E6C544B8B7}" type="presParOf" srcId="{18C69D56-AC6E-4A41-986D-C880BC21700A}" destId="{63849ED4-0E53-474A-99EB-BBA8BB2FE9AD}" srcOrd="0" destOrd="0" presId="urn:microsoft.com/office/officeart/2005/8/layout/default"/>
+  </dgm:cxnLst>
+  <dgm:bg/>
+  <dgm:whole/>
+  <dgm:extLst>
+    <a:ext uri="http://schemas.microsoft.com/office/drawing/2008/diagram">
+      <dsp:dataModelExt xmlns:dsp="http://schemas.microsoft.com/office/drawing/2008/diagram" relId="rId8" minVer="http://schemas.openxmlformats.org/drawingml/2006/diagram"/>
     </a:ext>
   </dgm:extLst>
 </dgm:dataModel>
@@ -2458,7 +3330,7 @@
         <a:ext cx="1990430" cy="1194258"/>
       </dsp:txXfrm>
     </dsp:sp>
-    <dsp:sp modelId="{A4256277-62EE-4890-9461-C9013E489523}">
+    <dsp:sp modelId="{67AE67B3-A238-48F2-8A36-DE8487384B01}">
       <dsp:nvSpPr>
         <dsp:cNvPr id="0" name=""/>
         <dsp:cNvSpPr/>
@@ -2536,7 +3408,7 @@
         <a:ext cx="1990430" cy="1194258"/>
       </dsp:txXfrm>
     </dsp:sp>
-    <dsp:sp modelId="{0316D1D0-8024-4D1D-AE4C-57BAF0749AC8}">
+    <dsp:sp modelId="{12235D26-346A-4F02-BA22-FBC4F3EDFF9C}">
       <dsp:nvSpPr>
         <dsp:cNvPr id="0" name=""/>
         <dsp:cNvSpPr/>
@@ -2614,7 +3486,7 @@
         <a:ext cx="1990430" cy="1194258"/>
       </dsp:txXfrm>
     </dsp:sp>
-    <dsp:sp modelId="{6C9E2FAC-7F24-46A9-B5FC-2AE3E533DFF9}">
+    <dsp:sp modelId="{9B7FDEC1-C852-40AD-9288-439B62C995B4}">
       <dsp:nvSpPr>
         <dsp:cNvPr id="0" name=""/>
         <dsp:cNvSpPr/>
@@ -2692,7 +3564,7 @@
         <a:ext cx="1990430" cy="1194258"/>
       </dsp:txXfrm>
     </dsp:sp>
-    <dsp:sp modelId="{A8270942-746C-4EAA-8837-16EFE7FAFDE7}">
+    <dsp:sp modelId="{A9CC1E8F-B0C3-4BE0-A70D-30F04DB17629}">
       <dsp:nvSpPr>
         <dsp:cNvPr id="0" name=""/>
         <dsp:cNvSpPr/>
@@ -2770,7 +3642,7 @@
         <a:ext cx="1990430" cy="1194258"/>
       </dsp:txXfrm>
     </dsp:sp>
-    <dsp:sp modelId="{6FC5C050-4B6B-4C5E-AFC5-AACA9FC28393}">
+    <dsp:sp modelId="{F37FC58E-235F-41FA-AB31-A387CAF2E6FA}">
       <dsp:nvSpPr>
         <dsp:cNvPr id="0" name=""/>
         <dsp:cNvSpPr/>
@@ -2910,12 +3782,12 @@
         </a:fontRef>
       </dsp:style>
       <dsp:txBody>
-        <a:bodyPr spcFirstLastPara="0" vert="horz" wrap="square" lIns="137160" tIns="137160" rIns="137160" bIns="137160" numCol="1" spcCol="1270" anchor="ctr" anchorCtr="0">
+        <a:bodyPr spcFirstLastPara="0" vert="horz" wrap="square" lIns="121920" tIns="121920" rIns="121920" bIns="121920" numCol="1" spcCol="1270" anchor="ctr" anchorCtr="0">
           <a:noAutofit/>
         </a:bodyPr>
         <a:lstStyle/>
         <a:p>
-          <a:pPr marL="0" lvl="0" indent="0" algn="ctr" defTabSz="1600200">
+          <a:pPr marL="0" lvl="0" indent="0" algn="ctr" defTabSz="1422400">
             <a:lnSpc>
               <a:spcPct val="90000"/>
             </a:lnSpc>
@@ -2928,8 +3800,8 @@
             <a:buNone/>
           </a:pPr>
           <a:r>
-            <a:rPr lang="en-US" sz="3600" kern="1200" dirty="0"/>
-            <a:t>Login</a:t>
+            <a:rPr lang="en-US" sz="3200" kern="1200" dirty="0"/>
+            <a:t>Observer</a:t>
           </a:r>
         </a:p>
       </dsp:txBody>
@@ -2938,7 +3810,7 @@
         <a:ext cx="1990430" cy="1194258"/>
       </dsp:txXfrm>
     </dsp:sp>
-    <dsp:sp modelId="{A4256277-62EE-4890-9461-C9013E489523}">
+    <dsp:sp modelId="{F650E8E9-20EF-4BF0-9D81-96ABE11EBDA4}">
       <dsp:nvSpPr>
         <dsp:cNvPr id="0" name=""/>
         <dsp:cNvSpPr/>
@@ -2988,12 +3860,12 @@
         </a:fontRef>
       </dsp:style>
       <dsp:txBody>
-        <a:bodyPr spcFirstLastPara="0" vert="horz" wrap="square" lIns="137160" tIns="137160" rIns="137160" bIns="137160" numCol="1" spcCol="1270" anchor="ctr" anchorCtr="0">
+        <a:bodyPr spcFirstLastPara="0" vert="horz" wrap="square" lIns="121920" tIns="121920" rIns="121920" bIns="121920" numCol="1" spcCol="1270" anchor="ctr" anchorCtr="0">
           <a:noAutofit/>
         </a:bodyPr>
         <a:lstStyle/>
         <a:p>
-          <a:pPr marL="0" lvl="0" indent="0" algn="ctr" defTabSz="1600200">
+          <a:pPr marL="0" lvl="0" indent="0" algn="ctr" defTabSz="1422400">
             <a:lnSpc>
               <a:spcPct val="90000"/>
             </a:lnSpc>
@@ -3006,8 +3878,8 @@
             <a:buNone/>
           </a:pPr>
           <a:r>
-            <a:rPr lang="en-US" sz="3600" kern="1200" dirty="0"/>
-            <a:t>Set Pin</a:t>
+            <a:rPr lang="en-US" sz="3200" kern="1200" dirty="0"/>
+            <a:t>State</a:t>
           </a:r>
         </a:p>
       </dsp:txBody>
@@ -3016,7 +3888,7 @@
         <a:ext cx="1990430" cy="1194258"/>
       </dsp:txXfrm>
     </dsp:sp>
-    <dsp:sp modelId="{0316D1D0-8024-4D1D-AE4C-57BAF0749AC8}">
+    <dsp:sp modelId="{902036ED-F45D-414E-A39B-87C1341A555A}">
       <dsp:nvSpPr>
         <dsp:cNvPr id="0" name=""/>
         <dsp:cNvSpPr/>
@@ -3066,12 +3938,12 @@
         </a:fontRef>
       </dsp:style>
       <dsp:txBody>
-        <a:bodyPr spcFirstLastPara="0" vert="horz" wrap="square" lIns="137160" tIns="137160" rIns="137160" bIns="137160" numCol="1" spcCol="1270" anchor="ctr" anchorCtr="0">
+        <a:bodyPr spcFirstLastPara="0" vert="horz" wrap="square" lIns="121920" tIns="121920" rIns="121920" bIns="121920" numCol="1" spcCol="1270" anchor="ctr" anchorCtr="0">
           <a:noAutofit/>
         </a:bodyPr>
         <a:lstStyle/>
         <a:p>
-          <a:pPr marL="0" lvl="0" indent="0" algn="ctr" defTabSz="1600200">
+          <a:pPr marL="0" lvl="0" indent="0" algn="ctr" defTabSz="1422400">
             <a:lnSpc>
               <a:spcPct val="90000"/>
             </a:lnSpc>
@@ -3084,8 +3956,8 @@
             <a:buNone/>
           </a:pPr>
           <a:r>
-            <a:rPr lang="en-US" sz="3600" kern="1200" dirty="0"/>
-            <a:t>My Card</a:t>
+            <a:rPr lang="en-US" sz="3200" kern="1200" dirty="0"/>
+            <a:t>Decorator</a:t>
           </a:r>
         </a:p>
       </dsp:txBody>
@@ -3094,7 +3966,7 @@
         <a:ext cx="1990430" cy="1194258"/>
       </dsp:txXfrm>
     </dsp:sp>
-    <dsp:sp modelId="{6C9E2FAC-7F24-46A9-B5FC-2AE3E533DFF9}">
+    <dsp:sp modelId="{665A54DB-3AD4-4FDD-9158-54C311F7024B}">
       <dsp:nvSpPr>
         <dsp:cNvPr id="0" name=""/>
         <dsp:cNvSpPr/>
@@ -3144,12 +4016,12 @@
         </a:fontRef>
       </dsp:style>
       <dsp:txBody>
-        <a:bodyPr spcFirstLastPara="0" vert="horz" wrap="square" lIns="137160" tIns="137160" rIns="137160" bIns="137160" numCol="1" spcCol="1270" anchor="ctr" anchorCtr="0">
+        <a:bodyPr spcFirstLastPara="0" vert="horz" wrap="square" lIns="121920" tIns="121920" rIns="121920" bIns="121920" numCol="1" spcCol="1270" anchor="ctr" anchorCtr="0">
           <a:noAutofit/>
         </a:bodyPr>
         <a:lstStyle/>
         <a:p>
-          <a:pPr marL="0" lvl="0" indent="0" algn="ctr" defTabSz="1600200">
+          <a:pPr marL="0" lvl="0" indent="0" algn="ctr" defTabSz="1422400">
             <a:lnSpc>
               <a:spcPct val="90000"/>
             </a:lnSpc>
@@ -3162,8 +4034,8 @@
             <a:buNone/>
           </a:pPr>
           <a:r>
-            <a:rPr lang="en-US" sz="3600" kern="1200" dirty="0"/>
-            <a:t>Add Card</a:t>
+            <a:rPr lang="en-US" sz="3200" kern="1200" dirty="0"/>
+            <a:t>Strategy</a:t>
           </a:r>
         </a:p>
       </dsp:txBody>
@@ -3172,7 +4044,7 @@
         <a:ext cx="1990430" cy="1194258"/>
       </dsp:txXfrm>
     </dsp:sp>
-    <dsp:sp modelId="{A8270942-746C-4EAA-8837-16EFE7FAFDE7}">
+    <dsp:sp modelId="{593180D3-1AFA-4D8A-82F5-A33D5B0CA155}">
       <dsp:nvSpPr>
         <dsp:cNvPr id="0" name=""/>
         <dsp:cNvSpPr/>
@@ -3222,12 +4094,12 @@
         </a:fontRef>
       </dsp:style>
       <dsp:txBody>
-        <a:bodyPr spcFirstLastPara="0" vert="horz" wrap="square" lIns="137160" tIns="137160" rIns="137160" bIns="137160" numCol="1" spcCol="1270" anchor="ctr" anchorCtr="0">
+        <a:bodyPr spcFirstLastPara="0" vert="horz" wrap="square" lIns="121920" tIns="121920" rIns="121920" bIns="121920" numCol="1" spcCol="1270" anchor="ctr" anchorCtr="0">
           <a:noAutofit/>
         </a:bodyPr>
         <a:lstStyle/>
         <a:p>
-          <a:pPr marL="0" lvl="0" indent="0" algn="ctr" defTabSz="1600200">
+          <a:pPr marL="0" lvl="0" indent="0" algn="ctr" defTabSz="1422400">
             <a:lnSpc>
               <a:spcPct val="90000"/>
             </a:lnSpc>
@@ -3240,8 +4112,8 @@
             <a:buNone/>
           </a:pPr>
           <a:r>
-            <a:rPr lang="en-US" sz="3600" kern="1200" dirty="0"/>
-            <a:t>Order</a:t>
+            <a:rPr lang="en-US" sz="3200" kern="1200" dirty="0"/>
+            <a:t>Command</a:t>
           </a:r>
         </a:p>
       </dsp:txBody>
@@ -3250,7 +4122,7 @@
         <a:ext cx="1990430" cy="1194258"/>
       </dsp:txXfrm>
     </dsp:sp>
-    <dsp:sp modelId="{6FC5C050-4B6B-4C5E-AFC5-AACA9FC28393}">
+    <dsp:sp modelId="{9760A73F-DE10-4741-9E51-CC1400856F7F}">
       <dsp:nvSpPr>
         <dsp:cNvPr id="0" name=""/>
         <dsp:cNvSpPr/>
@@ -3300,12 +4172,12 @@
         </a:fontRef>
       </dsp:style>
       <dsp:txBody>
-        <a:bodyPr spcFirstLastPara="0" vert="horz" wrap="square" lIns="137160" tIns="137160" rIns="137160" bIns="137160" numCol="1" spcCol="1270" anchor="ctr" anchorCtr="0">
+        <a:bodyPr spcFirstLastPara="0" vert="horz" wrap="square" lIns="121920" tIns="121920" rIns="121920" bIns="121920" numCol="1" spcCol="1270" anchor="ctr" anchorCtr="0">
           <a:noAutofit/>
         </a:bodyPr>
         <a:lstStyle/>
         <a:p>
-          <a:pPr marL="0" lvl="0" indent="0" algn="ctr" defTabSz="1600200">
+          <a:pPr marL="0" lvl="0" indent="0" algn="ctr" defTabSz="1422400">
             <a:lnSpc>
               <a:spcPct val="90000"/>
             </a:lnSpc>
@@ -3318,14 +4190,104 @@
             <a:buNone/>
           </a:pPr>
           <a:r>
-            <a:rPr lang="en-US" sz="3600" kern="1200" dirty="0"/>
-            <a:t>Pay</a:t>
+            <a:rPr lang="en-US" sz="3200" kern="1200" dirty="0"/>
+            <a:t>Visitor</a:t>
           </a:r>
         </a:p>
       </dsp:txBody>
       <dsp:txXfrm>
         <a:off x="2715954" y="2788557"/>
         <a:ext cx="1990430" cy="1194258"/>
+      </dsp:txXfrm>
+    </dsp:sp>
+  </dsp:spTree>
+</dsp:drawing>
+</file>
+
+<file path=ppt/diagrams/drawing3.xml><?xml version="1.0" encoding="utf-8"?>
+<dsp:drawing xmlns:dgm="http://schemas.openxmlformats.org/drawingml/2006/diagram" xmlns:dsp="http://schemas.microsoft.com/office/drawing/2008/diagram" xmlns:a="http://schemas.openxmlformats.org/drawingml/2006/main">
+  <dsp:spTree>
+    <dsp:nvGrpSpPr>
+      <dsp:cNvPr id="0" name=""/>
+      <dsp:cNvGrpSpPr/>
+    </dsp:nvGrpSpPr>
+    <dsp:grpSpPr/>
+    <dsp:sp modelId="{63849ED4-0E53-474A-99EB-BBA8BB2FE9AD}">
+      <dsp:nvSpPr>
+        <dsp:cNvPr id="0" name=""/>
+        <dsp:cNvSpPr/>
+      </dsp:nvSpPr>
+      <dsp:spPr>
+        <a:xfrm>
+          <a:off x="0" y="98432"/>
+          <a:ext cx="1709488" cy="1025692"/>
+        </a:xfrm>
+        <a:prstGeom prst="rect">
+          <a:avLst/>
+        </a:prstGeom>
+        <a:solidFill>
+          <a:schemeClr val="accent2">
+            <a:hueOff val="0"/>
+            <a:satOff val="0"/>
+            <a:lumOff val="0"/>
+            <a:alphaOff val="0"/>
+          </a:schemeClr>
+        </a:solidFill>
+        <a:ln w="12700" cap="flat" cmpd="sng" algn="ctr">
+          <a:solidFill>
+            <a:schemeClr val="lt1">
+              <a:hueOff val="0"/>
+              <a:satOff val="0"/>
+              <a:lumOff val="0"/>
+              <a:alphaOff val="0"/>
+            </a:schemeClr>
+          </a:solidFill>
+          <a:prstDash val="solid"/>
+          <a:miter lim="800000"/>
+        </a:ln>
+        <a:effectLst/>
+      </dsp:spPr>
+      <dsp:style>
+        <a:lnRef idx="2">
+          <a:scrgbClr r="0" g="0" b="0"/>
+        </a:lnRef>
+        <a:fillRef idx="1">
+          <a:scrgbClr r="0" g="0" b="0"/>
+        </a:fillRef>
+        <a:effectRef idx="0">
+          <a:scrgbClr r="0" g="0" b="0"/>
+        </a:effectRef>
+        <a:fontRef idx="minor">
+          <a:schemeClr val="lt1"/>
+        </a:fontRef>
+      </dsp:style>
+      <dsp:txBody>
+        <a:bodyPr spcFirstLastPara="0" vert="horz" wrap="square" lIns="118110" tIns="118110" rIns="118110" bIns="118110" numCol="1" spcCol="1270" anchor="ctr" anchorCtr="0">
+          <a:noAutofit/>
+        </a:bodyPr>
+        <a:lstStyle/>
+        <a:p>
+          <a:pPr marL="0" lvl="0" indent="0" algn="ctr" defTabSz="1377950">
+            <a:lnSpc>
+              <a:spcPct val="90000"/>
+            </a:lnSpc>
+            <a:spcBef>
+              <a:spcPct val="0"/>
+            </a:spcBef>
+            <a:spcAft>
+              <a:spcPct val="35000"/>
+            </a:spcAft>
+            <a:buNone/>
+          </a:pPr>
+          <a:r>
+            <a:rPr lang="en-US" sz="3100" kern="1200" dirty="0"/>
+            <a:t>Observer</a:t>
+          </a:r>
+        </a:p>
+      </dsp:txBody>
+      <dsp:txXfrm>
+        <a:off x="0" y="98432"/>
+        <a:ext cx="1709488" cy="1025692"/>
       </dsp:txXfrm>
     </dsp:sp>
   </dsp:spTree>
@@ -3626,6 +4588,153 @@
 </dgm:layoutDef>
 </file>
 
+<file path=ppt/diagrams/layout3.xml><?xml version="1.0" encoding="utf-8"?>
+<dgm:layoutDef xmlns:dgm="http://schemas.openxmlformats.org/drawingml/2006/diagram" xmlns:a="http://schemas.openxmlformats.org/drawingml/2006/main" uniqueId="urn:microsoft.com/office/officeart/2005/8/layout/default">
+  <dgm:title val=""/>
+  <dgm:desc val=""/>
+  <dgm:catLst>
+    <dgm:cat type="list" pri="400"/>
+  </dgm:catLst>
+  <dgm:sampData>
+    <dgm:dataModel>
+      <dgm:ptLst>
+        <dgm:pt modelId="0" type="doc"/>
+        <dgm:pt modelId="1">
+          <dgm:prSet phldr="1"/>
+        </dgm:pt>
+        <dgm:pt modelId="2">
+          <dgm:prSet phldr="1"/>
+        </dgm:pt>
+        <dgm:pt modelId="3">
+          <dgm:prSet phldr="1"/>
+        </dgm:pt>
+        <dgm:pt modelId="4">
+          <dgm:prSet phldr="1"/>
+        </dgm:pt>
+        <dgm:pt modelId="5">
+          <dgm:prSet phldr="1"/>
+        </dgm:pt>
+      </dgm:ptLst>
+      <dgm:cxnLst>
+        <dgm:cxn modelId="6" srcId="0" destId="1" srcOrd="0" destOrd="0"/>
+        <dgm:cxn modelId="7" srcId="0" destId="2" srcOrd="1" destOrd="0"/>
+        <dgm:cxn modelId="8" srcId="0" destId="3" srcOrd="2" destOrd="0"/>
+        <dgm:cxn modelId="9" srcId="0" destId="4" srcOrd="3" destOrd="0"/>
+        <dgm:cxn modelId="10" srcId="0" destId="5" srcOrd="4" destOrd="0"/>
+      </dgm:cxnLst>
+      <dgm:bg/>
+      <dgm:whole/>
+    </dgm:dataModel>
+  </dgm:sampData>
+  <dgm:styleData>
+    <dgm:dataModel>
+      <dgm:ptLst>
+        <dgm:pt modelId="0" type="doc"/>
+        <dgm:pt modelId="1"/>
+        <dgm:pt modelId="2"/>
+      </dgm:ptLst>
+      <dgm:cxnLst>
+        <dgm:cxn modelId="3" srcId="0" destId="1" srcOrd="0" destOrd="0"/>
+        <dgm:cxn modelId="4" srcId="0" destId="2" srcOrd="1" destOrd="0"/>
+      </dgm:cxnLst>
+      <dgm:bg/>
+      <dgm:whole/>
+    </dgm:dataModel>
+  </dgm:styleData>
+  <dgm:clrData>
+    <dgm:dataModel>
+      <dgm:ptLst>
+        <dgm:pt modelId="0" type="doc"/>
+        <dgm:pt modelId="1"/>
+        <dgm:pt modelId="2"/>
+        <dgm:pt modelId="3"/>
+        <dgm:pt modelId="4"/>
+        <dgm:pt modelId="5"/>
+        <dgm:pt modelId="6"/>
+      </dgm:ptLst>
+      <dgm:cxnLst>
+        <dgm:cxn modelId="7" srcId="0" destId="1" srcOrd="0" destOrd="0"/>
+        <dgm:cxn modelId="8" srcId="0" destId="2" srcOrd="1" destOrd="0"/>
+        <dgm:cxn modelId="9" srcId="0" destId="3" srcOrd="2" destOrd="0"/>
+        <dgm:cxn modelId="10" srcId="0" destId="4" srcOrd="3" destOrd="0"/>
+        <dgm:cxn modelId="11" srcId="0" destId="5" srcOrd="4" destOrd="0"/>
+        <dgm:cxn modelId="12" srcId="0" destId="6" srcOrd="5" destOrd="0"/>
+      </dgm:cxnLst>
+      <dgm:bg/>
+      <dgm:whole/>
+    </dgm:dataModel>
+  </dgm:clrData>
+  <dgm:layoutNode name="diagram">
+    <dgm:varLst>
+      <dgm:dir/>
+      <dgm:resizeHandles val="exact"/>
+    </dgm:varLst>
+    <dgm:choose name="Name0">
+      <dgm:if name="Name1" func="var" arg="dir" op="equ" val="norm">
+        <dgm:alg type="snake">
+          <dgm:param type="grDir" val="tL"/>
+          <dgm:param type="flowDir" val="row"/>
+          <dgm:param type="contDir" val="sameDir"/>
+          <dgm:param type="off" val="ctr"/>
+        </dgm:alg>
+      </dgm:if>
+      <dgm:else name="Name2">
+        <dgm:alg type="snake">
+          <dgm:param type="grDir" val="tR"/>
+          <dgm:param type="flowDir" val="row"/>
+          <dgm:param type="contDir" val="sameDir"/>
+          <dgm:param type="off" val="ctr"/>
+        </dgm:alg>
+      </dgm:else>
+    </dgm:choose>
+    <dgm:shape xmlns:r="http://schemas.openxmlformats.org/officeDocument/2006/relationships" r:blip="">
+      <dgm:adjLst/>
+    </dgm:shape>
+    <dgm:presOf/>
+    <dgm:constrLst>
+      <dgm:constr type="w" for="ch" forName="node" refType="w"/>
+      <dgm:constr type="h" for="ch" forName="node" refType="w" refFor="ch" refForName="node" fact="0.6"/>
+      <dgm:constr type="w" for="ch" forName="sibTrans" refType="w" refFor="ch" refForName="node" fact="0.1"/>
+      <dgm:constr type="sp" refType="w" refFor="ch" refForName="sibTrans"/>
+      <dgm:constr type="primFontSz" for="ch" forName="node" op="equ" val="65"/>
+    </dgm:constrLst>
+    <dgm:ruleLst/>
+    <dgm:forEach name="Name3" axis="ch" ptType="node">
+      <dgm:layoutNode name="node">
+        <dgm:varLst>
+          <dgm:bulletEnabled val="1"/>
+        </dgm:varLst>
+        <dgm:alg type="tx"/>
+        <dgm:shape xmlns:r="http://schemas.openxmlformats.org/officeDocument/2006/relationships" type="rect" r:blip="">
+          <dgm:adjLst/>
+        </dgm:shape>
+        <dgm:presOf axis="desOrSelf" ptType="node"/>
+        <dgm:constrLst>
+          <dgm:constr type="lMarg" refType="primFontSz" fact="0.3"/>
+          <dgm:constr type="rMarg" refType="primFontSz" fact="0.3"/>
+          <dgm:constr type="tMarg" refType="primFontSz" fact="0.3"/>
+          <dgm:constr type="bMarg" refType="primFontSz" fact="0.3"/>
+        </dgm:constrLst>
+        <dgm:ruleLst>
+          <dgm:rule type="primFontSz" val="5" fact="NaN" max="NaN"/>
+        </dgm:ruleLst>
+      </dgm:layoutNode>
+      <dgm:forEach name="Name4" axis="followSib" ptType="sibTrans" cnt="1">
+        <dgm:layoutNode name="sibTrans">
+          <dgm:alg type="sp"/>
+          <dgm:shape xmlns:r="http://schemas.openxmlformats.org/officeDocument/2006/relationships" r:blip="">
+            <dgm:adjLst/>
+          </dgm:shape>
+          <dgm:presOf/>
+          <dgm:constrLst/>
+          <dgm:ruleLst/>
+        </dgm:layoutNode>
+      </dgm:forEach>
+    </dgm:forEach>
+  </dgm:layoutNode>
+</dgm:layoutDef>
+</file>
+
 <file path=ppt/diagrams/quickStyle1.xml><?xml version="1.0" encoding="utf-8"?>
 <dgm:styleDef xmlns:dgm="http://schemas.openxmlformats.org/drawingml/2006/diagram" xmlns:a="http://schemas.openxmlformats.org/drawingml/2006/main" uniqueId="urn:microsoft.com/office/officeart/2005/8/quickstyle/simple1">
   <dgm:title val=""/>
@@ -4661,6 +5770,1040 @@
 </file>
 
 <file path=ppt/diagrams/quickStyle2.xml><?xml version="1.0" encoding="utf-8"?>
+<dgm:styleDef xmlns:dgm="http://schemas.openxmlformats.org/drawingml/2006/diagram" xmlns:a="http://schemas.openxmlformats.org/drawingml/2006/main" uniqueId="urn:microsoft.com/office/officeart/2005/8/quickstyle/simple1">
+  <dgm:title val=""/>
+  <dgm:desc val=""/>
+  <dgm:catLst>
+    <dgm:cat type="simple" pri="10100"/>
+  </dgm:catLst>
+  <dgm:scene3d>
+    <a:camera prst="orthographicFront"/>
+    <a:lightRig rig="threePt" dir="t"/>
+  </dgm:scene3d>
+  <dgm:styleLbl name="node0">
+    <dgm:scene3d>
+      <a:camera prst="orthographicFront"/>
+      <a:lightRig rig="threePt" dir="t"/>
+    </dgm:scene3d>
+    <dgm:sp3d/>
+    <dgm:txPr/>
+    <dgm:style>
+      <a:lnRef idx="2">
+        <a:scrgbClr r="0" g="0" b="0"/>
+      </a:lnRef>
+      <a:fillRef idx="1">
+        <a:scrgbClr r="0" g="0" b="0"/>
+      </a:fillRef>
+      <a:effectRef idx="0">
+        <a:scrgbClr r="0" g="0" b="0"/>
+      </a:effectRef>
+      <a:fontRef idx="minor">
+        <a:schemeClr val="lt1"/>
+      </a:fontRef>
+    </dgm:style>
+  </dgm:styleLbl>
+  <dgm:styleLbl name="lnNode1">
+    <dgm:scene3d>
+      <a:camera prst="orthographicFront"/>
+      <a:lightRig rig="threePt" dir="t"/>
+    </dgm:scene3d>
+    <dgm:sp3d/>
+    <dgm:txPr/>
+    <dgm:style>
+      <a:lnRef idx="2">
+        <a:scrgbClr r="0" g="0" b="0"/>
+      </a:lnRef>
+      <a:fillRef idx="1">
+        <a:scrgbClr r="0" g="0" b="0"/>
+      </a:fillRef>
+      <a:effectRef idx="0">
+        <a:scrgbClr r="0" g="0" b="0"/>
+      </a:effectRef>
+      <a:fontRef idx="minor">
+        <a:schemeClr val="lt1"/>
+      </a:fontRef>
+    </dgm:style>
+  </dgm:styleLbl>
+  <dgm:styleLbl name="vennNode1">
+    <dgm:scene3d>
+      <a:camera prst="orthographicFront"/>
+      <a:lightRig rig="threePt" dir="t"/>
+    </dgm:scene3d>
+    <dgm:sp3d/>
+    <dgm:txPr/>
+    <dgm:style>
+      <a:lnRef idx="2">
+        <a:scrgbClr r="0" g="0" b="0"/>
+      </a:lnRef>
+      <a:fillRef idx="1">
+        <a:scrgbClr r="0" g="0" b="0"/>
+      </a:fillRef>
+      <a:effectRef idx="0">
+        <a:scrgbClr r="0" g="0" b="0"/>
+      </a:effectRef>
+      <a:fontRef idx="minor">
+        <a:schemeClr val="tx1"/>
+      </a:fontRef>
+    </dgm:style>
+  </dgm:styleLbl>
+  <dgm:styleLbl name="alignNode1">
+    <dgm:scene3d>
+      <a:camera prst="orthographicFront"/>
+      <a:lightRig rig="threePt" dir="t"/>
+    </dgm:scene3d>
+    <dgm:sp3d/>
+    <dgm:txPr/>
+    <dgm:style>
+      <a:lnRef idx="2">
+        <a:scrgbClr r="0" g="0" b="0"/>
+      </a:lnRef>
+      <a:fillRef idx="1">
+        <a:scrgbClr r="0" g="0" b="0"/>
+      </a:fillRef>
+      <a:effectRef idx="0">
+        <a:scrgbClr r="0" g="0" b="0"/>
+      </a:effectRef>
+      <a:fontRef idx="minor">
+        <a:schemeClr val="lt1"/>
+      </a:fontRef>
+    </dgm:style>
+  </dgm:styleLbl>
+  <dgm:styleLbl name="node1">
+    <dgm:scene3d>
+      <a:camera prst="orthographicFront"/>
+      <a:lightRig rig="threePt" dir="t"/>
+    </dgm:scene3d>
+    <dgm:sp3d/>
+    <dgm:txPr/>
+    <dgm:style>
+      <a:lnRef idx="2">
+        <a:scrgbClr r="0" g="0" b="0"/>
+      </a:lnRef>
+      <a:fillRef idx="1">
+        <a:scrgbClr r="0" g="0" b="0"/>
+      </a:fillRef>
+      <a:effectRef idx="0">
+        <a:scrgbClr r="0" g="0" b="0"/>
+      </a:effectRef>
+      <a:fontRef idx="minor">
+        <a:schemeClr val="lt1"/>
+      </a:fontRef>
+    </dgm:style>
+  </dgm:styleLbl>
+  <dgm:styleLbl name="node2">
+    <dgm:scene3d>
+      <a:camera prst="orthographicFront"/>
+      <a:lightRig rig="threePt" dir="t"/>
+    </dgm:scene3d>
+    <dgm:sp3d/>
+    <dgm:txPr/>
+    <dgm:style>
+      <a:lnRef idx="2">
+        <a:scrgbClr r="0" g="0" b="0"/>
+      </a:lnRef>
+      <a:fillRef idx="1">
+        <a:scrgbClr r="0" g="0" b="0"/>
+      </a:fillRef>
+      <a:effectRef idx="0">
+        <a:scrgbClr r="0" g="0" b="0"/>
+      </a:effectRef>
+      <a:fontRef idx="minor">
+        <a:schemeClr val="lt1"/>
+      </a:fontRef>
+    </dgm:style>
+  </dgm:styleLbl>
+  <dgm:styleLbl name="node3">
+    <dgm:scene3d>
+      <a:camera prst="orthographicFront"/>
+      <a:lightRig rig="threePt" dir="t"/>
+    </dgm:scene3d>
+    <dgm:sp3d/>
+    <dgm:txPr/>
+    <dgm:style>
+      <a:lnRef idx="2">
+        <a:scrgbClr r="0" g="0" b="0"/>
+      </a:lnRef>
+      <a:fillRef idx="1">
+        <a:scrgbClr r="0" g="0" b="0"/>
+      </a:fillRef>
+      <a:effectRef idx="0">
+        <a:scrgbClr r="0" g="0" b="0"/>
+      </a:effectRef>
+      <a:fontRef idx="minor">
+        <a:schemeClr val="lt1"/>
+      </a:fontRef>
+    </dgm:style>
+  </dgm:styleLbl>
+  <dgm:styleLbl name="node4">
+    <dgm:scene3d>
+      <a:camera prst="orthographicFront"/>
+      <a:lightRig rig="threePt" dir="t"/>
+    </dgm:scene3d>
+    <dgm:sp3d/>
+    <dgm:txPr/>
+    <dgm:style>
+      <a:lnRef idx="2">
+        <a:scrgbClr r="0" g="0" b="0"/>
+      </a:lnRef>
+      <a:fillRef idx="1">
+        <a:scrgbClr r="0" g="0" b="0"/>
+      </a:fillRef>
+      <a:effectRef idx="0">
+        <a:scrgbClr r="0" g="0" b="0"/>
+      </a:effectRef>
+      <a:fontRef idx="minor">
+        <a:schemeClr val="lt1"/>
+      </a:fontRef>
+    </dgm:style>
+  </dgm:styleLbl>
+  <dgm:styleLbl name="fgImgPlace1">
+    <dgm:scene3d>
+      <a:camera prst="orthographicFront"/>
+      <a:lightRig rig="threePt" dir="t"/>
+    </dgm:scene3d>
+    <dgm:sp3d/>
+    <dgm:txPr/>
+    <dgm:style>
+      <a:lnRef idx="2">
+        <a:scrgbClr r="0" g="0" b="0"/>
+      </a:lnRef>
+      <a:fillRef idx="1">
+        <a:scrgbClr r="0" g="0" b="0"/>
+      </a:fillRef>
+      <a:effectRef idx="0">
+        <a:scrgbClr r="0" g="0" b="0"/>
+      </a:effectRef>
+      <a:fontRef idx="minor"/>
+    </dgm:style>
+  </dgm:styleLbl>
+  <dgm:styleLbl name="alignImgPlace1">
+    <dgm:scene3d>
+      <a:camera prst="orthographicFront"/>
+      <a:lightRig rig="threePt" dir="t"/>
+    </dgm:scene3d>
+    <dgm:sp3d/>
+    <dgm:txPr/>
+    <dgm:style>
+      <a:lnRef idx="2">
+        <a:scrgbClr r="0" g="0" b="0"/>
+      </a:lnRef>
+      <a:fillRef idx="1">
+        <a:scrgbClr r="0" g="0" b="0"/>
+      </a:fillRef>
+      <a:effectRef idx="0">
+        <a:scrgbClr r="0" g="0" b="0"/>
+      </a:effectRef>
+      <a:fontRef idx="minor"/>
+    </dgm:style>
+  </dgm:styleLbl>
+  <dgm:styleLbl name="bgImgPlace1">
+    <dgm:scene3d>
+      <a:camera prst="orthographicFront"/>
+      <a:lightRig rig="threePt" dir="t"/>
+    </dgm:scene3d>
+    <dgm:sp3d/>
+    <dgm:txPr/>
+    <dgm:style>
+      <a:lnRef idx="2">
+        <a:scrgbClr r="0" g="0" b="0"/>
+      </a:lnRef>
+      <a:fillRef idx="1">
+        <a:scrgbClr r="0" g="0" b="0"/>
+      </a:fillRef>
+      <a:effectRef idx="0">
+        <a:scrgbClr r="0" g="0" b="0"/>
+      </a:effectRef>
+      <a:fontRef idx="minor"/>
+    </dgm:style>
+  </dgm:styleLbl>
+  <dgm:styleLbl name="sibTrans2D1">
+    <dgm:scene3d>
+      <a:camera prst="orthographicFront"/>
+      <a:lightRig rig="threePt" dir="t"/>
+    </dgm:scene3d>
+    <dgm:sp3d/>
+    <dgm:txPr/>
+    <dgm:style>
+      <a:lnRef idx="0">
+        <a:scrgbClr r="0" g="0" b="0"/>
+      </a:lnRef>
+      <a:fillRef idx="1">
+        <a:scrgbClr r="0" g="0" b="0"/>
+      </a:fillRef>
+      <a:effectRef idx="0">
+        <a:scrgbClr r="0" g="0" b="0"/>
+      </a:effectRef>
+      <a:fontRef idx="minor">
+        <a:schemeClr val="lt1"/>
+      </a:fontRef>
+    </dgm:style>
+  </dgm:styleLbl>
+  <dgm:styleLbl name="fgSibTrans2D1">
+    <dgm:scene3d>
+      <a:camera prst="orthographicFront"/>
+      <a:lightRig rig="threePt" dir="t"/>
+    </dgm:scene3d>
+    <dgm:sp3d/>
+    <dgm:txPr/>
+    <dgm:style>
+      <a:lnRef idx="0">
+        <a:scrgbClr r="0" g="0" b="0"/>
+      </a:lnRef>
+      <a:fillRef idx="1">
+        <a:scrgbClr r="0" g="0" b="0"/>
+      </a:fillRef>
+      <a:effectRef idx="0">
+        <a:scrgbClr r="0" g="0" b="0"/>
+      </a:effectRef>
+      <a:fontRef idx="minor">
+        <a:schemeClr val="lt1"/>
+      </a:fontRef>
+    </dgm:style>
+  </dgm:styleLbl>
+  <dgm:styleLbl name="bgSibTrans2D1">
+    <dgm:scene3d>
+      <a:camera prst="orthographicFront"/>
+      <a:lightRig rig="threePt" dir="t"/>
+    </dgm:scene3d>
+    <dgm:sp3d/>
+    <dgm:txPr/>
+    <dgm:style>
+      <a:lnRef idx="0">
+        <a:scrgbClr r="0" g="0" b="0"/>
+      </a:lnRef>
+      <a:fillRef idx="1">
+        <a:scrgbClr r="0" g="0" b="0"/>
+      </a:fillRef>
+      <a:effectRef idx="0">
+        <a:scrgbClr r="0" g="0" b="0"/>
+      </a:effectRef>
+      <a:fontRef idx="minor">
+        <a:schemeClr val="lt1"/>
+      </a:fontRef>
+    </dgm:style>
+  </dgm:styleLbl>
+  <dgm:styleLbl name="sibTrans1D1">
+    <dgm:scene3d>
+      <a:camera prst="orthographicFront"/>
+      <a:lightRig rig="threePt" dir="t"/>
+    </dgm:scene3d>
+    <dgm:sp3d/>
+    <dgm:txPr/>
+    <dgm:style>
+      <a:lnRef idx="1">
+        <a:scrgbClr r="0" g="0" b="0"/>
+      </a:lnRef>
+      <a:fillRef idx="0">
+        <a:scrgbClr r="0" g="0" b="0"/>
+      </a:fillRef>
+      <a:effectRef idx="0">
+        <a:scrgbClr r="0" g="0" b="0"/>
+      </a:effectRef>
+      <a:fontRef idx="minor"/>
+    </dgm:style>
+  </dgm:styleLbl>
+  <dgm:styleLbl name="callout">
+    <dgm:scene3d>
+      <a:camera prst="orthographicFront"/>
+      <a:lightRig rig="threePt" dir="t"/>
+    </dgm:scene3d>
+    <dgm:sp3d/>
+    <dgm:txPr/>
+    <dgm:style>
+      <a:lnRef idx="2">
+        <a:scrgbClr r="0" g="0" b="0"/>
+      </a:lnRef>
+      <a:fillRef idx="1">
+        <a:scrgbClr r="0" g="0" b="0"/>
+      </a:fillRef>
+      <a:effectRef idx="0">
+        <a:scrgbClr r="0" g="0" b="0"/>
+      </a:effectRef>
+      <a:fontRef idx="minor"/>
+    </dgm:style>
+  </dgm:styleLbl>
+  <dgm:styleLbl name="asst0">
+    <dgm:scene3d>
+      <a:camera prst="orthographicFront"/>
+      <a:lightRig rig="threePt" dir="t"/>
+    </dgm:scene3d>
+    <dgm:sp3d/>
+    <dgm:txPr/>
+    <dgm:style>
+      <a:lnRef idx="2">
+        <a:scrgbClr r="0" g="0" b="0"/>
+      </a:lnRef>
+      <a:fillRef idx="1">
+        <a:scrgbClr r="0" g="0" b="0"/>
+      </a:fillRef>
+      <a:effectRef idx="0">
+        <a:scrgbClr r="0" g="0" b="0"/>
+      </a:effectRef>
+      <a:fontRef idx="minor">
+        <a:schemeClr val="lt1"/>
+      </a:fontRef>
+    </dgm:style>
+  </dgm:styleLbl>
+  <dgm:styleLbl name="asst1">
+    <dgm:scene3d>
+      <a:camera prst="orthographicFront"/>
+      <a:lightRig rig="threePt" dir="t"/>
+    </dgm:scene3d>
+    <dgm:sp3d/>
+    <dgm:txPr/>
+    <dgm:style>
+      <a:lnRef idx="2">
+        <a:scrgbClr r="0" g="0" b="0"/>
+      </a:lnRef>
+      <a:fillRef idx="1">
+        <a:scrgbClr r="0" g="0" b="0"/>
+      </a:fillRef>
+      <a:effectRef idx="0">
+        <a:scrgbClr r="0" g="0" b="0"/>
+      </a:effectRef>
+      <a:fontRef idx="minor">
+        <a:schemeClr val="lt1"/>
+      </a:fontRef>
+    </dgm:style>
+  </dgm:styleLbl>
+  <dgm:styleLbl name="asst2">
+    <dgm:scene3d>
+      <a:camera prst="orthographicFront"/>
+      <a:lightRig rig="threePt" dir="t"/>
+    </dgm:scene3d>
+    <dgm:sp3d/>
+    <dgm:txPr/>
+    <dgm:style>
+      <a:lnRef idx="2">
+        <a:scrgbClr r="0" g="0" b="0"/>
+      </a:lnRef>
+      <a:fillRef idx="1">
+        <a:scrgbClr r="0" g="0" b="0"/>
+      </a:fillRef>
+      <a:effectRef idx="0">
+        <a:scrgbClr r="0" g="0" b="0"/>
+      </a:effectRef>
+      <a:fontRef idx="minor">
+        <a:schemeClr val="lt1"/>
+      </a:fontRef>
+    </dgm:style>
+  </dgm:styleLbl>
+  <dgm:styleLbl name="asst3">
+    <dgm:scene3d>
+      <a:camera prst="orthographicFront"/>
+      <a:lightRig rig="threePt" dir="t"/>
+    </dgm:scene3d>
+    <dgm:sp3d/>
+    <dgm:txPr/>
+    <dgm:style>
+      <a:lnRef idx="2">
+        <a:scrgbClr r="0" g="0" b="0"/>
+      </a:lnRef>
+      <a:fillRef idx="1">
+        <a:scrgbClr r="0" g="0" b="0"/>
+      </a:fillRef>
+      <a:effectRef idx="0">
+        <a:scrgbClr r="0" g="0" b="0"/>
+      </a:effectRef>
+      <a:fontRef idx="minor">
+        <a:schemeClr val="lt1"/>
+      </a:fontRef>
+    </dgm:style>
+  </dgm:styleLbl>
+  <dgm:styleLbl name="asst4">
+    <dgm:scene3d>
+      <a:camera prst="orthographicFront"/>
+      <a:lightRig rig="threePt" dir="t"/>
+    </dgm:scene3d>
+    <dgm:sp3d/>
+    <dgm:txPr/>
+    <dgm:style>
+      <a:lnRef idx="2">
+        <a:scrgbClr r="0" g="0" b="0"/>
+      </a:lnRef>
+      <a:fillRef idx="1">
+        <a:scrgbClr r="0" g="0" b="0"/>
+      </a:fillRef>
+      <a:effectRef idx="0">
+        <a:scrgbClr r="0" g="0" b="0"/>
+      </a:effectRef>
+      <a:fontRef idx="minor">
+        <a:schemeClr val="lt1"/>
+      </a:fontRef>
+    </dgm:style>
+  </dgm:styleLbl>
+  <dgm:styleLbl name="parChTrans2D1">
+    <dgm:scene3d>
+      <a:camera prst="orthographicFront"/>
+      <a:lightRig rig="threePt" dir="t"/>
+    </dgm:scene3d>
+    <dgm:sp3d/>
+    <dgm:txPr/>
+    <dgm:style>
+      <a:lnRef idx="2">
+        <a:scrgbClr r="0" g="0" b="0"/>
+      </a:lnRef>
+      <a:fillRef idx="1">
+        <a:scrgbClr r="0" g="0" b="0"/>
+      </a:fillRef>
+      <a:effectRef idx="0">
+        <a:scrgbClr r="0" g="0" b="0"/>
+      </a:effectRef>
+      <a:fontRef idx="minor">
+        <a:schemeClr val="lt1"/>
+      </a:fontRef>
+    </dgm:style>
+  </dgm:styleLbl>
+  <dgm:styleLbl name="parChTrans2D2">
+    <dgm:scene3d>
+      <a:camera prst="orthographicFront"/>
+      <a:lightRig rig="threePt" dir="t"/>
+    </dgm:scene3d>
+    <dgm:sp3d/>
+    <dgm:txPr/>
+    <dgm:style>
+      <a:lnRef idx="2">
+        <a:scrgbClr r="0" g="0" b="0"/>
+      </a:lnRef>
+      <a:fillRef idx="1">
+        <a:scrgbClr r="0" g="0" b="0"/>
+      </a:fillRef>
+      <a:effectRef idx="0">
+        <a:scrgbClr r="0" g="0" b="0"/>
+      </a:effectRef>
+      <a:fontRef idx="minor">
+        <a:schemeClr val="lt1"/>
+      </a:fontRef>
+    </dgm:style>
+  </dgm:styleLbl>
+  <dgm:styleLbl name="parChTrans2D3">
+    <dgm:scene3d>
+      <a:camera prst="orthographicFront"/>
+      <a:lightRig rig="threePt" dir="t"/>
+    </dgm:scene3d>
+    <dgm:sp3d/>
+    <dgm:txPr/>
+    <dgm:style>
+      <a:lnRef idx="2">
+        <a:scrgbClr r="0" g="0" b="0"/>
+      </a:lnRef>
+      <a:fillRef idx="1">
+        <a:scrgbClr r="0" g="0" b="0"/>
+      </a:fillRef>
+      <a:effectRef idx="0">
+        <a:scrgbClr r="0" g="0" b="0"/>
+      </a:effectRef>
+      <a:fontRef idx="minor">
+        <a:schemeClr val="lt1"/>
+      </a:fontRef>
+    </dgm:style>
+  </dgm:styleLbl>
+  <dgm:styleLbl name="parChTrans2D4">
+    <dgm:scene3d>
+      <a:camera prst="orthographicFront"/>
+      <a:lightRig rig="threePt" dir="t"/>
+    </dgm:scene3d>
+    <dgm:sp3d/>
+    <dgm:txPr/>
+    <dgm:style>
+      <a:lnRef idx="2">
+        <a:scrgbClr r="0" g="0" b="0"/>
+      </a:lnRef>
+      <a:fillRef idx="1">
+        <a:scrgbClr r="0" g="0" b="0"/>
+      </a:fillRef>
+      <a:effectRef idx="0">
+        <a:scrgbClr r="0" g="0" b="0"/>
+      </a:effectRef>
+      <a:fontRef idx="minor">
+        <a:schemeClr val="lt1"/>
+      </a:fontRef>
+    </dgm:style>
+  </dgm:styleLbl>
+  <dgm:styleLbl name="parChTrans1D1">
+    <dgm:scene3d>
+      <a:camera prst="orthographicFront"/>
+      <a:lightRig rig="threePt" dir="t"/>
+    </dgm:scene3d>
+    <dgm:sp3d/>
+    <dgm:txPr/>
+    <dgm:style>
+      <a:lnRef idx="2">
+        <a:scrgbClr r="0" g="0" b="0"/>
+      </a:lnRef>
+      <a:fillRef idx="0">
+        <a:scrgbClr r="0" g="0" b="0"/>
+      </a:fillRef>
+      <a:effectRef idx="0">
+        <a:scrgbClr r="0" g="0" b="0"/>
+      </a:effectRef>
+      <a:fontRef idx="minor"/>
+    </dgm:style>
+  </dgm:styleLbl>
+  <dgm:styleLbl name="parChTrans1D2">
+    <dgm:scene3d>
+      <a:camera prst="orthographicFront"/>
+      <a:lightRig rig="threePt" dir="t"/>
+    </dgm:scene3d>
+    <dgm:sp3d/>
+    <dgm:txPr/>
+    <dgm:style>
+      <a:lnRef idx="2">
+        <a:scrgbClr r="0" g="0" b="0"/>
+      </a:lnRef>
+      <a:fillRef idx="0">
+        <a:scrgbClr r="0" g="0" b="0"/>
+      </a:fillRef>
+      <a:effectRef idx="0">
+        <a:scrgbClr r="0" g="0" b="0"/>
+      </a:effectRef>
+      <a:fontRef idx="minor"/>
+    </dgm:style>
+  </dgm:styleLbl>
+  <dgm:styleLbl name="parChTrans1D3">
+    <dgm:scene3d>
+      <a:camera prst="orthographicFront"/>
+      <a:lightRig rig="threePt" dir="t"/>
+    </dgm:scene3d>
+    <dgm:sp3d/>
+    <dgm:txPr/>
+    <dgm:style>
+      <a:lnRef idx="2">
+        <a:scrgbClr r="0" g="0" b="0"/>
+      </a:lnRef>
+      <a:fillRef idx="0">
+        <a:scrgbClr r="0" g="0" b="0"/>
+      </a:fillRef>
+      <a:effectRef idx="0">
+        <a:scrgbClr r="0" g="0" b="0"/>
+      </a:effectRef>
+      <a:fontRef idx="minor"/>
+    </dgm:style>
+  </dgm:styleLbl>
+  <dgm:styleLbl name="parChTrans1D4">
+    <dgm:scene3d>
+      <a:camera prst="orthographicFront"/>
+      <a:lightRig rig="threePt" dir="t"/>
+    </dgm:scene3d>
+    <dgm:sp3d/>
+    <dgm:txPr/>
+    <dgm:style>
+      <a:lnRef idx="2">
+        <a:scrgbClr r="0" g="0" b="0"/>
+      </a:lnRef>
+      <a:fillRef idx="0">
+        <a:scrgbClr r="0" g="0" b="0"/>
+      </a:fillRef>
+      <a:effectRef idx="0">
+        <a:scrgbClr r="0" g="0" b="0"/>
+      </a:effectRef>
+      <a:fontRef idx="minor"/>
+    </dgm:style>
+  </dgm:styleLbl>
+  <dgm:styleLbl name="fgAcc1">
+    <dgm:scene3d>
+      <a:camera prst="orthographicFront"/>
+      <a:lightRig rig="threePt" dir="t"/>
+    </dgm:scene3d>
+    <dgm:sp3d/>
+    <dgm:txPr/>
+    <dgm:style>
+      <a:lnRef idx="2">
+        <a:scrgbClr r="0" g="0" b="0"/>
+      </a:lnRef>
+      <a:fillRef idx="1">
+        <a:scrgbClr r="0" g="0" b="0"/>
+      </a:fillRef>
+      <a:effectRef idx="0">
+        <a:scrgbClr r="0" g="0" b="0"/>
+      </a:effectRef>
+      <a:fontRef idx="minor"/>
+    </dgm:style>
+  </dgm:styleLbl>
+  <dgm:styleLbl name="conFgAcc1">
+    <dgm:scene3d>
+      <a:camera prst="orthographicFront"/>
+      <a:lightRig rig="threePt" dir="t"/>
+    </dgm:scene3d>
+    <dgm:sp3d/>
+    <dgm:txPr/>
+    <dgm:style>
+      <a:lnRef idx="2">
+        <a:scrgbClr r="0" g="0" b="0"/>
+      </a:lnRef>
+      <a:fillRef idx="1">
+        <a:scrgbClr r="0" g="0" b="0"/>
+      </a:fillRef>
+      <a:effectRef idx="0">
+        <a:scrgbClr r="0" g="0" b="0"/>
+      </a:effectRef>
+      <a:fontRef idx="minor"/>
+    </dgm:style>
+  </dgm:styleLbl>
+  <dgm:styleLbl name="alignAcc1">
+    <dgm:scene3d>
+      <a:camera prst="orthographicFront"/>
+      <a:lightRig rig="threePt" dir="t"/>
+    </dgm:scene3d>
+    <dgm:sp3d/>
+    <dgm:txPr/>
+    <dgm:style>
+      <a:lnRef idx="2">
+        <a:scrgbClr r="0" g="0" b="0"/>
+      </a:lnRef>
+      <a:fillRef idx="1">
+        <a:scrgbClr r="0" g="0" b="0"/>
+      </a:fillRef>
+      <a:effectRef idx="0">
+        <a:scrgbClr r="0" g="0" b="0"/>
+      </a:effectRef>
+      <a:fontRef idx="minor"/>
+    </dgm:style>
+  </dgm:styleLbl>
+  <dgm:styleLbl name="trAlignAcc1">
+    <dgm:scene3d>
+      <a:camera prst="orthographicFront"/>
+      <a:lightRig rig="threePt" dir="t"/>
+    </dgm:scene3d>
+    <dgm:sp3d/>
+    <dgm:txPr/>
+    <dgm:style>
+      <a:lnRef idx="1">
+        <a:scrgbClr r="0" g="0" b="0"/>
+      </a:lnRef>
+      <a:fillRef idx="1">
+        <a:scrgbClr r="0" g="0" b="0"/>
+      </a:fillRef>
+      <a:effectRef idx="0">
+        <a:scrgbClr r="0" g="0" b="0"/>
+      </a:effectRef>
+      <a:fontRef idx="minor"/>
+    </dgm:style>
+  </dgm:styleLbl>
+  <dgm:styleLbl name="bgAcc1">
+    <dgm:scene3d>
+      <a:camera prst="orthographicFront"/>
+      <a:lightRig rig="threePt" dir="t"/>
+    </dgm:scene3d>
+    <dgm:sp3d/>
+    <dgm:txPr/>
+    <dgm:style>
+      <a:lnRef idx="2">
+        <a:scrgbClr r="0" g="0" b="0"/>
+      </a:lnRef>
+      <a:fillRef idx="1">
+        <a:scrgbClr r="0" g="0" b="0"/>
+      </a:fillRef>
+      <a:effectRef idx="0">
+        <a:scrgbClr r="0" g="0" b="0"/>
+      </a:effectRef>
+      <a:fontRef idx="minor"/>
+    </dgm:style>
+  </dgm:styleLbl>
+  <dgm:styleLbl name="solidFgAcc1">
+    <dgm:scene3d>
+      <a:camera prst="orthographicFront"/>
+      <a:lightRig rig="threePt" dir="t"/>
+    </dgm:scene3d>
+    <dgm:sp3d/>
+    <dgm:txPr/>
+    <dgm:style>
+      <a:lnRef idx="2">
+        <a:scrgbClr r="0" g="0" b="0"/>
+      </a:lnRef>
+      <a:fillRef idx="1">
+        <a:scrgbClr r="0" g="0" b="0"/>
+      </a:fillRef>
+      <a:effectRef idx="0">
+        <a:scrgbClr r="0" g="0" b="0"/>
+      </a:effectRef>
+      <a:fontRef idx="minor"/>
+    </dgm:style>
+  </dgm:styleLbl>
+  <dgm:styleLbl name="solidAlignAcc1">
+    <dgm:scene3d>
+      <a:camera prst="orthographicFront"/>
+      <a:lightRig rig="threePt" dir="t"/>
+    </dgm:scene3d>
+    <dgm:sp3d/>
+    <dgm:txPr/>
+    <dgm:style>
+      <a:lnRef idx="2">
+        <a:scrgbClr r="0" g="0" b="0"/>
+      </a:lnRef>
+      <a:fillRef idx="1">
+        <a:scrgbClr r="0" g="0" b="0"/>
+      </a:fillRef>
+      <a:effectRef idx="0">
+        <a:scrgbClr r="0" g="0" b="0"/>
+      </a:effectRef>
+      <a:fontRef idx="minor"/>
+    </dgm:style>
+  </dgm:styleLbl>
+  <dgm:styleLbl name="solidBgAcc1">
+    <dgm:scene3d>
+      <a:camera prst="orthographicFront"/>
+      <a:lightRig rig="threePt" dir="t"/>
+    </dgm:scene3d>
+    <dgm:sp3d/>
+    <dgm:txPr/>
+    <dgm:style>
+      <a:lnRef idx="2">
+        <a:scrgbClr r="0" g="0" b="0"/>
+      </a:lnRef>
+      <a:fillRef idx="1">
+        <a:scrgbClr r="0" g="0" b="0"/>
+      </a:fillRef>
+      <a:effectRef idx="0">
+        <a:scrgbClr r="0" g="0" b="0"/>
+      </a:effectRef>
+      <a:fontRef idx="minor"/>
+    </dgm:style>
+  </dgm:styleLbl>
+  <dgm:styleLbl name="fgAccFollowNode1">
+    <dgm:scene3d>
+      <a:camera prst="orthographicFront"/>
+      <a:lightRig rig="threePt" dir="t"/>
+    </dgm:scene3d>
+    <dgm:sp3d/>
+    <dgm:txPr/>
+    <dgm:style>
+      <a:lnRef idx="2">
+        <a:scrgbClr r="0" g="0" b="0"/>
+      </a:lnRef>
+      <a:fillRef idx="1">
+        <a:scrgbClr r="0" g="0" b="0"/>
+      </a:fillRef>
+      <a:effectRef idx="0">
+        <a:scrgbClr r="0" g="0" b="0"/>
+      </a:effectRef>
+      <a:fontRef idx="minor"/>
+    </dgm:style>
+  </dgm:styleLbl>
+  <dgm:styleLbl name="alignAccFollowNode1">
+    <dgm:scene3d>
+      <a:camera prst="orthographicFront"/>
+      <a:lightRig rig="threePt" dir="t"/>
+    </dgm:scene3d>
+    <dgm:sp3d/>
+    <dgm:txPr/>
+    <dgm:style>
+      <a:lnRef idx="2">
+        <a:scrgbClr r="0" g="0" b="0"/>
+      </a:lnRef>
+      <a:fillRef idx="1">
+        <a:scrgbClr r="0" g="0" b="0"/>
+      </a:fillRef>
+      <a:effectRef idx="0">
+        <a:scrgbClr r="0" g="0" b="0"/>
+      </a:effectRef>
+      <a:fontRef idx="minor"/>
+    </dgm:style>
+  </dgm:styleLbl>
+  <dgm:styleLbl name="bgAccFollowNode1">
+    <dgm:scene3d>
+      <a:camera prst="orthographicFront"/>
+      <a:lightRig rig="threePt" dir="t"/>
+    </dgm:scene3d>
+    <dgm:sp3d/>
+    <dgm:txPr/>
+    <dgm:style>
+      <a:lnRef idx="2">
+        <a:scrgbClr r="0" g="0" b="0"/>
+      </a:lnRef>
+      <a:fillRef idx="1">
+        <a:scrgbClr r="0" g="0" b="0"/>
+      </a:fillRef>
+      <a:effectRef idx="0">
+        <a:scrgbClr r="0" g="0" b="0"/>
+      </a:effectRef>
+      <a:fontRef idx="minor"/>
+    </dgm:style>
+  </dgm:styleLbl>
+  <dgm:styleLbl name="fgAcc0">
+    <dgm:scene3d>
+      <a:camera prst="orthographicFront"/>
+      <a:lightRig rig="threePt" dir="t"/>
+    </dgm:scene3d>
+    <dgm:sp3d/>
+    <dgm:txPr/>
+    <dgm:style>
+      <a:lnRef idx="2">
+        <a:scrgbClr r="0" g="0" b="0"/>
+      </a:lnRef>
+      <a:fillRef idx="1">
+        <a:scrgbClr r="0" g="0" b="0"/>
+      </a:fillRef>
+      <a:effectRef idx="0">
+        <a:scrgbClr r="0" g="0" b="0"/>
+      </a:effectRef>
+      <a:fontRef idx="minor"/>
+    </dgm:style>
+  </dgm:styleLbl>
+  <dgm:styleLbl name="fgAcc2">
+    <dgm:scene3d>
+      <a:camera prst="orthographicFront"/>
+      <a:lightRig rig="threePt" dir="t"/>
+    </dgm:scene3d>
+    <dgm:sp3d/>
+    <dgm:txPr/>
+    <dgm:style>
+      <a:lnRef idx="2">
+        <a:scrgbClr r="0" g="0" b="0"/>
+      </a:lnRef>
+      <a:fillRef idx="1">
+        <a:scrgbClr r="0" g="0" b="0"/>
+      </a:fillRef>
+      <a:effectRef idx="0">
+        <a:scrgbClr r="0" g="0" b="0"/>
+      </a:effectRef>
+      <a:fontRef idx="minor"/>
+    </dgm:style>
+  </dgm:styleLbl>
+  <dgm:styleLbl name="fgAcc3">
+    <dgm:scene3d>
+      <a:camera prst="orthographicFront"/>
+      <a:lightRig rig="threePt" dir="t"/>
+    </dgm:scene3d>
+    <dgm:sp3d/>
+    <dgm:txPr/>
+    <dgm:style>
+      <a:lnRef idx="2">
+        <a:scrgbClr r="0" g="0" b="0"/>
+      </a:lnRef>
+      <a:fillRef idx="1">
+        <a:scrgbClr r="0" g="0" b="0"/>
+      </a:fillRef>
+      <a:effectRef idx="0">
+        <a:scrgbClr r="0" g="0" b="0"/>
+      </a:effectRef>
+      <a:fontRef idx="minor"/>
+    </dgm:style>
+  </dgm:styleLbl>
+  <dgm:styleLbl name="fgAcc4">
+    <dgm:scene3d>
+      <a:camera prst="orthographicFront"/>
+      <a:lightRig rig="threePt" dir="t"/>
+    </dgm:scene3d>
+    <dgm:sp3d/>
+    <dgm:txPr/>
+    <dgm:style>
+      <a:lnRef idx="2">
+        <a:scrgbClr r="0" g="0" b="0"/>
+      </a:lnRef>
+      <a:fillRef idx="1">
+        <a:scrgbClr r="0" g="0" b="0"/>
+      </a:fillRef>
+      <a:effectRef idx="0">
+        <a:scrgbClr r="0" g="0" b="0"/>
+      </a:effectRef>
+      <a:fontRef idx="minor"/>
+    </dgm:style>
+  </dgm:styleLbl>
+  <dgm:styleLbl name="bgShp">
+    <dgm:scene3d>
+      <a:camera prst="orthographicFront"/>
+      <a:lightRig rig="threePt" dir="t"/>
+    </dgm:scene3d>
+    <dgm:sp3d/>
+    <dgm:txPr/>
+    <dgm:style>
+      <a:lnRef idx="0">
+        <a:scrgbClr r="0" g="0" b="0"/>
+      </a:lnRef>
+      <a:fillRef idx="1">
+        <a:scrgbClr r="0" g="0" b="0"/>
+      </a:fillRef>
+      <a:effectRef idx="0">
+        <a:scrgbClr r="0" g="0" b="0"/>
+      </a:effectRef>
+      <a:fontRef idx="minor"/>
+    </dgm:style>
+  </dgm:styleLbl>
+  <dgm:styleLbl name="dkBgShp">
+    <dgm:scene3d>
+      <a:camera prst="orthographicFront"/>
+      <a:lightRig rig="threePt" dir="t"/>
+    </dgm:scene3d>
+    <dgm:sp3d/>
+    <dgm:txPr/>
+    <dgm:style>
+      <a:lnRef idx="0">
+        <a:scrgbClr r="0" g="0" b="0"/>
+      </a:lnRef>
+      <a:fillRef idx="1">
+        <a:scrgbClr r="0" g="0" b="0"/>
+      </a:fillRef>
+      <a:effectRef idx="0">
+        <a:scrgbClr r="0" g="0" b="0"/>
+      </a:effectRef>
+      <a:fontRef idx="minor"/>
+    </dgm:style>
+  </dgm:styleLbl>
+  <dgm:styleLbl name="trBgShp">
+    <dgm:scene3d>
+      <a:camera prst="orthographicFront"/>
+      <a:lightRig rig="threePt" dir="t"/>
+    </dgm:scene3d>
+    <dgm:sp3d/>
+    <dgm:txPr/>
+    <dgm:style>
+      <a:lnRef idx="0">
+        <a:scrgbClr r="0" g="0" b="0"/>
+      </a:lnRef>
+      <a:fillRef idx="1">
+        <a:scrgbClr r="0" g="0" b="0"/>
+      </a:fillRef>
+      <a:effectRef idx="0">
+        <a:scrgbClr r="0" g="0" b="0"/>
+      </a:effectRef>
+      <a:fontRef idx="minor"/>
+    </dgm:style>
+  </dgm:styleLbl>
+  <dgm:styleLbl name="fgShp">
+    <dgm:scene3d>
+      <a:camera prst="orthographicFront"/>
+      <a:lightRig rig="threePt" dir="t"/>
+    </dgm:scene3d>
+    <dgm:sp3d/>
+    <dgm:txPr/>
+    <dgm:style>
+      <a:lnRef idx="2">
+        <a:scrgbClr r="0" g="0" b="0"/>
+      </a:lnRef>
+      <a:fillRef idx="1">
+        <a:scrgbClr r="0" g="0" b="0"/>
+      </a:fillRef>
+      <a:effectRef idx="0">
+        <a:scrgbClr r="0" g="0" b="0"/>
+      </a:effectRef>
+      <a:fontRef idx="minor"/>
+    </dgm:style>
+  </dgm:styleLbl>
+  <dgm:styleLbl name="revTx">
+    <dgm:scene3d>
+      <a:camera prst="orthographicFront"/>
+      <a:lightRig rig="threePt" dir="t"/>
+    </dgm:scene3d>
+    <dgm:sp3d/>
+    <dgm:txPr/>
+    <dgm:style>
+      <a:lnRef idx="0">
+        <a:scrgbClr r="0" g="0" b="0"/>
+      </a:lnRef>
+      <a:fillRef idx="0">
+        <a:scrgbClr r="0" g="0" b="0"/>
+      </a:fillRef>
+      <a:effectRef idx="0">
+        <a:scrgbClr r="0" g="0" b="0"/>
+      </a:effectRef>
+      <a:fontRef idx="minor"/>
+    </dgm:style>
+  </dgm:styleLbl>
+</dgm:styleDef>
+</file>
+
+<file path=ppt/diagrams/quickStyle3.xml><?xml version="1.0" encoding="utf-8"?>
 <dgm:styleDef xmlns:dgm="http://schemas.openxmlformats.org/drawingml/2006/diagram" xmlns:a="http://schemas.openxmlformats.org/drawingml/2006/main" uniqueId="urn:microsoft.com/office/officeart/2005/8/quickstyle/simple1">
   <dgm:title val=""/>
   <dgm:desc val=""/>
@@ -6192,7 +8335,7 @@
           <a:p>
             <a:fld id="{BBCFCC0C-0224-4F49-9F2D-4E0E357637FA}" type="slidenum">
               <a:rPr lang="en-US" smtClean="0"/>
-              <a:t>9</a:t>
+              <a:t>10</a:t>
             </a:fld>
             <a:endParaRPr lang="en-US"/>
           </a:p>
@@ -9498,7 +11641,7 @@
           <p:nvPr>
             <p:extLst>
               <p:ext uri="{D42A27DB-BD31-4B8C-83A1-F6EECF244321}">
-                <p14:modId xmlns:p14="http://schemas.microsoft.com/office/powerpoint/2010/main" val="4112254325"/>
+                <p14:modId xmlns:p14="http://schemas.microsoft.com/office/powerpoint/2010/main" val="2292919302"/>
               </p:ext>
             </p:extLst>
           </p:nvPr>
@@ -9581,6 +11724,100 @@
       </p:grpSpPr>
       <p:pic>
         <p:nvPicPr>
+          <p:cNvPr id="3" name="Picture 2">
+            <a:extLst>
+              <a:ext uri="{FF2B5EF4-FFF2-40B4-BE49-F238E27FC236}">
+                <a16:creationId xmlns:a16="http://schemas.microsoft.com/office/drawing/2014/main" id="{18A32CEE-97F6-402E-B53C-40898023DA3A}"/>
+              </a:ext>
+            </a:extLst>
+          </p:cNvPr>
+          <p:cNvPicPr>
+            <a:picLocks noChangeAspect="1"/>
+          </p:cNvPicPr>
+          <p:nvPr/>
+        </p:nvPicPr>
+        <p:blipFill>
+          <a:blip r:embed="rId3">
+            <a:extLst>
+              <a:ext uri="{28A0092B-C50C-407E-A947-70E740481C1C}">
+                <a14:useLocalDpi xmlns:a14="http://schemas.microsoft.com/office/drawing/2010/main" val="0"/>
+              </a:ext>
+            </a:extLst>
+          </a:blip>
+          <a:stretch>
+            <a:fillRect/>
+          </a:stretch>
+        </p:blipFill>
+        <p:spPr>
+          <a:xfrm>
+            <a:off x="0" y="875701"/>
+            <a:ext cx="12192000" cy="5106597"/>
+          </a:xfrm>
+          <a:prstGeom prst="rect">
+            <a:avLst/>
+          </a:prstGeom>
+        </p:spPr>
+      </p:pic>
+      <p:graphicFrame>
+        <p:nvGraphicFramePr>
+          <p:cNvPr id="4" name="Diagram 3">
+            <a:extLst>
+              <a:ext uri="{FF2B5EF4-FFF2-40B4-BE49-F238E27FC236}">
+                <a16:creationId xmlns:a16="http://schemas.microsoft.com/office/drawing/2014/main" id="{2DDB29E0-E4A2-4AC6-95BD-EF4E98FEE76B}"/>
+              </a:ext>
+            </a:extLst>
+          </p:cNvPr>
+          <p:cNvGraphicFramePr/>
+          <p:nvPr>
+            <p:extLst>
+              <p:ext uri="{D42A27DB-BD31-4B8C-83A1-F6EECF244321}">
+                <p14:modId xmlns:p14="http://schemas.microsoft.com/office/powerpoint/2010/main" val="525445295"/>
+              </p:ext>
+            </p:extLst>
+          </p:nvPr>
+        </p:nvGraphicFramePr>
+        <p:xfrm>
+          <a:off x="656207" y="5033394"/>
+          <a:ext cx="1709488" cy="1124125"/>
+        </p:xfrm>
+        <a:graphic>
+          <a:graphicData uri="http://schemas.openxmlformats.org/drawingml/2006/diagram">
+            <dgm:relIds xmlns:dgm="http://schemas.openxmlformats.org/drawingml/2006/diagram" xmlns:r="http://schemas.openxmlformats.org/officeDocument/2006/relationships" r:dm="rId4" r:lo="rId5" r:qs="rId6" r:cs="rId7"/>
+          </a:graphicData>
+        </a:graphic>
+      </p:graphicFrame>
+    </p:spTree>
+    <p:extLst>
+      <p:ext uri="{BB962C8B-B14F-4D97-AF65-F5344CB8AC3E}">
+        <p14:creationId xmlns:p14="http://schemas.microsoft.com/office/powerpoint/2010/main" val="2587523644"/>
+      </p:ext>
+    </p:extLst>
+  </p:cSld>
+  <p:clrMapOvr>
+    <a:masterClrMapping/>
+  </p:clrMapOvr>
+</p:sld>
+</file>
+
+<file path=ppt/slides/slide11.xml><?xml version="1.0" encoding="utf-8"?>
+<p:sld xmlns:a="http://schemas.openxmlformats.org/drawingml/2006/main" xmlns:r="http://schemas.openxmlformats.org/officeDocument/2006/relationships" xmlns:p="http://schemas.openxmlformats.org/presentationml/2006/main">
+  <p:cSld>
+    <p:spTree>
+      <p:nvGrpSpPr>
+        <p:cNvPr id="1" name=""/>
+        <p:cNvGrpSpPr/>
+        <p:nvPr/>
+      </p:nvGrpSpPr>
+      <p:grpSpPr>
+        <a:xfrm>
+          <a:off x="0" y="0"/>
+          <a:ext cx="0" cy="0"/>
+          <a:chOff x="0" y="0"/>
+          <a:chExt cx="0" cy="0"/>
+        </a:xfrm>
+      </p:grpSpPr>
+      <p:pic>
+        <p:nvPicPr>
           <p:cNvPr id="6" name="Picture 5">
             <a:extLst>
               <a:ext uri="{FF2B5EF4-FFF2-40B4-BE49-F238E27FC236}">
@@ -9615,6 +11852,138 @@
           </a:prstGeom>
         </p:spPr>
       </p:pic>
+      <p:grpSp>
+        <p:nvGrpSpPr>
+          <p:cNvPr id="3" name="Group 2">
+            <a:extLst>
+              <a:ext uri="{FF2B5EF4-FFF2-40B4-BE49-F238E27FC236}">
+                <a16:creationId xmlns:a16="http://schemas.microsoft.com/office/drawing/2014/main" id="{4BCE3A2E-3B77-464D-9E85-E015D0D90CB6}"/>
+              </a:ext>
+            </a:extLst>
+          </p:cNvPr>
+          <p:cNvGrpSpPr/>
+          <p:nvPr/>
+        </p:nvGrpSpPr>
+        <p:grpSpPr>
+          <a:xfrm>
+            <a:off x="644088" y="5108116"/>
+            <a:ext cx="1709488" cy="1025692"/>
+            <a:chOff x="0" y="98432"/>
+            <a:chExt cx="1709488" cy="1025692"/>
+          </a:xfrm>
+        </p:grpSpPr>
+        <p:sp>
+          <p:nvSpPr>
+            <p:cNvPr id="4" name="Rectangle 3">
+              <a:extLst>
+                <a:ext uri="{FF2B5EF4-FFF2-40B4-BE49-F238E27FC236}">
+                  <a16:creationId xmlns:a16="http://schemas.microsoft.com/office/drawing/2014/main" id="{CED17877-6296-4B82-B1F7-FEDC4606A290}"/>
+                </a:ext>
+              </a:extLst>
+            </p:cNvPr>
+            <p:cNvSpPr/>
+            <p:nvPr/>
+          </p:nvSpPr>
+          <p:spPr>
+            <a:xfrm>
+              <a:off x="0" y="98432"/>
+              <a:ext cx="1709488" cy="1025692"/>
+            </a:xfrm>
+            <a:prstGeom prst="rect">
+              <a:avLst/>
+            </a:prstGeom>
+          </p:spPr>
+          <p:style>
+            <a:lnRef idx="2">
+              <a:schemeClr val="lt1">
+                <a:hueOff val="0"/>
+                <a:satOff val="0"/>
+                <a:lumOff val="0"/>
+                <a:alphaOff val="0"/>
+              </a:schemeClr>
+            </a:lnRef>
+            <a:fillRef idx="1">
+              <a:schemeClr val="accent2">
+                <a:hueOff val="0"/>
+                <a:satOff val="0"/>
+                <a:lumOff val="0"/>
+                <a:alphaOff val="0"/>
+              </a:schemeClr>
+            </a:fillRef>
+            <a:effectRef idx="0">
+              <a:schemeClr val="accent2">
+                <a:hueOff val="0"/>
+                <a:satOff val="0"/>
+                <a:lumOff val="0"/>
+                <a:alphaOff val="0"/>
+              </a:schemeClr>
+            </a:effectRef>
+            <a:fontRef idx="minor">
+              <a:schemeClr val="lt1"/>
+            </a:fontRef>
+          </p:style>
+        </p:sp>
+        <p:sp>
+          <p:nvSpPr>
+            <p:cNvPr id="5" name="TextBox 4">
+              <a:extLst>
+                <a:ext uri="{FF2B5EF4-FFF2-40B4-BE49-F238E27FC236}">
+                  <a16:creationId xmlns:a16="http://schemas.microsoft.com/office/drawing/2014/main" id="{1ECBCE2E-764D-47D4-877E-CD5F87371CC6}"/>
+                </a:ext>
+              </a:extLst>
+            </p:cNvPr>
+            <p:cNvSpPr txBox="1"/>
+            <p:nvPr/>
+          </p:nvSpPr>
+          <p:spPr>
+            <a:xfrm>
+              <a:off x="0" y="98432"/>
+              <a:ext cx="1709488" cy="1025692"/>
+            </a:xfrm>
+            <a:prstGeom prst="rect">
+              <a:avLst/>
+            </a:prstGeom>
+          </p:spPr>
+          <p:style>
+            <a:lnRef idx="0">
+              <a:scrgbClr r="0" g="0" b="0"/>
+            </a:lnRef>
+            <a:fillRef idx="0">
+              <a:scrgbClr r="0" g="0" b="0"/>
+            </a:fillRef>
+            <a:effectRef idx="0">
+              <a:scrgbClr r="0" g="0" b="0"/>
+            </a:effectRef>
+            <a:fontRef idx="minor">
+              <a:schemeClr val="lt1"/>
+            </a:fontRef>
+          </p:style>
+          <p:txBody>
+            <a:bodyPr spcFirstLastPara="0" vert="horz" wrap="square" lIns="118110" tIns="118110" rIns="118110" bIns="118110" numCol="1" spcCol="1270" anchor="ctr" anchorCtr="0">
+              <a:noAutofit/>
+            </a:bodyPr>
+            <a:lstStyle/>
+            <a:p>
+              <a:pPr marL="0" lvl="0" indent="0" algn="ctr" defTabSz="1377950">
+                <a:lnSpc>
+                  <a:spcPct val="90000"/>
+                </a:lnSpc>
+                <a:spcBef>
+                  <a:spcPct val="0"/>
+                </a:spcBef>
+                <a:spcAft>
+                  <a:spcPct val="35000"/>
+                </a:spcAft>
+                <a:buNone/>
+              </a:pPr>
+              <a:r>
+                <a:rPr lang="en-US" sz="3100" kern="1200" dirty="0"/>
+                <a:t>Observer</a:t>
+              </a:r>
+            </a:p>
+          </p:txBody>
+        </p:sp>
+      </p:grpSp>
     </p:spTree>
     <p:extLst>
       <p:ext uri="{BB962C8B-B14F-4D97-AF65-F5344CB8AC3E}">
@@ -9628,7 +11997,7 @@
 </p:sld>
 </file>
 
-<file path=ppt/slides/slide11.xml><?xml version="1.0" encoding="utf-8"?>
+<file path=ppt/slides/slide12.xml><?xml version="1.0" encoding="utf-8"?>
 <p:sld xmlns:a="http://schemas.openxmlformats.org/drawingml/2006/main" xmlns:r="http://schemas.openxmlformats.org/officeDocument/2006/relationships" xmlns:p="http://schemas.openxmlformats.org/presentationml/2006/main">
   <p:cSld>
     <p:spTree>
@@ -9675,28 +12044,6 @@
           </a:prstGeom>
         </p:spPr>
       </p:pic>
-      <p:graphicFrame>
-        <p:nvGraphicFramePr>
-          <p:cNvPr id="5" name="Diagram 4">
-            <a:extLst>
-              <a:ext uri="{FF2B5EF4-FFF2-40B4-BE49-F238E27FC236}">
-                <a16:creationId xmlns:a16="http://schemas.microsoft.com/office/drawing/2014/main" id="{74296290-FFD5-4FD6-A8A5-CC725076EB93}"/>
-              </a:ext>
-            </a:extLst>
-          </p:cNvPr>
-          <p:cNvGraphicFramePr/>
-          <p:nvPr/>
-        </p:nvGraphicFramePr>
-        <p:xfrm>
-          <a:off x="-300138" y="1140902"/>
-          <a:ext cx="5232866" cy="3984771"/>
-        </p:xfrm>
-        <a:graphic>
-          <a:graphicData uri="http://schemas.openxmlformats.org/drawingml/2006/diagram">
-            <dgm:relIds xmlns:dgm="http://schemas.openxmlformats.org/drawingml/2006/diagram" xmlns:r="http://schemas.openxmlformats.org/officeDocument/2006/relationships" r:dm="rId3" r:lo="rId4" r:qs="rId5" r:cs="rId6"/>
-          </a:graphicData>
-        </a:graphic>
-      </p:graphicFrame>
       <p:sp>
         <p:nvSpPr>
           <p:cNvPr id="2" name="TextBox 1">
@@ -9711,7 +12058,7 @@
         </p:nvSpPr>
         <p:spPr>
           <a:xfrm>
-            <a:off x="8355435" y="2650921"/>
+            <a:off x="1182848" y="2659559"/>
             <a:ext cx="1737976" cy="769441"/>
           </a:xfrm>
           <a:prstGeom prst="rect">
@@ -9740,7 +12087,7 @@
     </p:spTree>
     <p:extLst>
       <p:ext uri="{BB962C8B-B14F-4D97-AF65-F5344CB8AC3E}">
-        <p14:creationId xmlns:p14="http://schemas.microsoft.com/office/powerpoint/2010/main" val="2732701584"/>
+        <p14:creationId xmlns:p14="http://schemas.microsoft.com/office/powerpoint/2010/main" val="52029587"/>
       </p:ext>
     </p:extLst>
   </p:cSld>
@@ -9796,13 +12143,6 @@
             <a:noFill/>
           </a:ln>
           <a:extLst>
-            <a:ext uri="{909E8E84-426E-40DD-AFC4-6F175D3DCCD1}">
-              <a14:hiddenFill xmlns:a14="http://schemas.microsoft.com/office/drawing/2010/main">
-                <a:solidFill>
-                  <a:schemeClr val="accent1"/>
-                </a:solidFill>
-              </a14:hiddenFill>
-            </a:ext>
             <a:ext uri="{91240B29-F687-4F45-9708-019B960494DF}">
               <a14:hiddenLine xmlns:a14="http://schemas.microsoft.com/office/drawing/2010/main" w="9525">
                 <a:solidFill>
@@ -10041,13 +12381,6 @@
             <a:noFill/>
           </a:ln>
           <a:extLst>
-            <a:ext uri="{909E8E84-426E-40DD-AFC4-6F175D3DCCD1}">
-              <a14:hiddenFill xmlns:a14="http://schemas.microsoft.com/office/drawing/2010/main">
-                <a:solidFill>
-                  <a:schemeClr val="accent1"/>
-                </a:solidFill>
-              </a14:hiddenFill>
-            </a:ext>
             <a:ext uri="{91240B29-F687-4F45-9708-019B960494DF}">
               <a14:hiddenLine xmlns:a14="http://schemas.microsoft.com/office/drawing/2010/main" w="9525">
                 <a:solidFill>
@@ -10408,13 +12741,6 @@
             <a:noFill/>
           </a:ln>
           <a:extLst>
-            <a:ext uri="{909E8E84-426E-40DD-AFC4-6F175D3DCCD1}">
-              <a14:hiddenFill xmlns:a14="http://schemas.microsoft.com/office/drawing/2010/main">
-                <a:solidFill>
-                  <a:schemeClr val="accent1"/>
-                </a:solidFill>
-              </a14:hiddenFill>
-            </a:ext>
             <a:ext uri="{91240B29-F687-4F45-9708-019B960494DF}">
               <a14:hiddenLine xmlns:a14="http://schemas.microsoft.com/office/drawing/2010/main" w="9525">
                 <a:solidFill>
@@ -10639,13 +12965,6 @@
             <a:noFill/>
           </a:ln>
           <a:extLst>
-            <a:ext uri="{909E8E84-426E-40DD-AFC4-6F175D3DCCD1}">
-              <a14:hiddenFill xmlns:a14="http://schemas.microsoft.com/office/drawing/2010/main">
-                <a:solidFill>
-                  <a:schemeClr val="accent1"/>
-                </a:solidFill>
-              </a14:hiddenFill>
-            </a:ext>
             <a:ext uri="{91240B29-F687-4F45-9708-019B960494DF}">
               <a14:hiddenLine xmlns:a14="http://schemas.microsoft.com/office/drawing/2010/main" w="9525">
                 <a:solidFill>
@@ -11044,13 +13363,6 @@
             <a:noFill/>
           </a:ln>
           <a:extLst>
-            <a:ext uri="{909E8E84-426E-40DD-AFC4-6F175D3DCCD1}">
-              <a14:hiddenFill xmlns:a14="http://schemas.microsoft.com/office/drawing/2010/main">
-                <a:solidFill>
-                  <a:schemeClr val="accent1"/>
-                </a:solidFill>
-              </a14:hiddenFill>
-            </a:ext>
             <a:ext uri="{91240B29-F687-4F45-9708-019B960494DF}">
               <a14:hiddenLine xmlns:a14="http://schemas.microsoft.com/office/drawing/2010/main" w="9525">
                 <a:solidFill>
@@ -11277,13 +13589,6 @@
             <a:noFill/>
           </a:ln>
           <a:extLst>
-            <a:ext uri="{909E8E84-426E-40DD-AFC4-6F175D3DCCD1}">
-              <a14:hiddenFill xmlns:a14="http://schemas.microsoft.com/office/drawing/2010/main">
-                <a:solidFill>
-                  <a:schemeClr val="accent1"/>
-                </a:solidFill>
-              </a14:hiddenFill>
-            </a:ext>
             <a:ext uri="{91240B29-F687-4F45-9708-019B960494DF}">
               <a14:hiddenLine xmlns:a14="http://schemas.microsoft.com/office/drawing/2010/main" w="9525">
                 <a:solidFill>
@@ -11481,13 +13786,6 @@
             <a:noFill/>
           </a:ln>
           <a:extLst>
-            <a:ext uri="{909E8E84-426E-40DD-AFC4-6F175D3DCCD1}">
-              <a14:hiddenFill xmlns:a14="http://schemas.microsoft.com/office/drawing/2010/main">
-                <a:solidFill>
-                  <a:schemeClr val="accent1"/>
-                </a:solidFill>
-              </a14:hiddenFill>
-            </a:ext>
             <a:ext uri="{91240B29-F687-4F45-9708-019B960494DF}">
               <a14:hiddenLine xmlns:a14="http://schemas.microsoft.com/office/drawing/2010/main" w="9525">
                 <a:solidFill>
@@ -11685,13 +13983,6 @@
             <a:noFill/>
           </a:ln>
           <a:extLst>
-            <a:ext uri="{909E8E84-426E-40DD-AFC4-6F175D3DCCD1}">
-              <a14:hiddenFill xmlns:a14="http://schemas.microsoft.com/office/drawing/2010/main">
-                <a:solidFill>
-                  <a:schemeClr val="accent1"/>
-                </a:solidFill>
-              </a14:hiddenFill>
-            </a:ext>
             <a:ext uri="{91240B29-F687-4F45-9708-019B960494DF}">
               <a14:hiddenLine xmlns:a14="http://schemas.microsoft.com/office/drawing/2010/main" w="9525">
                 <a:solidFill>
@@ -11964,10 +14255,10 @@
       </p:grpSpPr>
       <p:pic>
         <p:nvPicPr>
-          <p:cNvPr id="3" name="Picture 2">
+          <p:cNvPr id="4" name="Picture 3">
             <a:extLst>
               <a:ext uri="{FF2B5EF4-FFF2-40B4-BE49-F238E27FC236}">
-                <a16:creationId xmlns:a16="http://schemas.microsoft.com/office/drawing/2014/main" id="{18A32CEE-97F6-402E-B53C-40898023DA3A}"/>
+                <a16:creationId xmlns:a16="http://schemas.microsoft.com/office/drawing/2014/main" id="{E9EF71D8-EFF8-4BB3-9A25-D9E2194DB488}"/>
               </a:ext>
             </a:extLst>
           </p:cNvPr>
@@ -11977,31 +14268,93 @@
           <p:nvPr/>
         </p:nvPicPr>
         <p:blipFill>
-          <a:blip r:embed="rId3">
-            <a:extLst>
-              <a:ext uri="{28A0092B-C50C-407E-A947-70E740481C1C}">
-                <a14:useLocalDpi xmlns:a14="http://schemas.microsoft.com/office/drawing/2010/main" val="0"/>
-              </a:ext>
-            </a:extLst>
-          </a:blip>
+          <a:blip r:embed="rId2"/>
           <a:stretch>
             <a:fillRect/>
           </a:stretch>
         </p:blipFill>
         <p:spPr>
           <a:xfrm>
-            <a:off x="0" y="875701"/>
-            <a:ext cx="12192000" cy="5106597"/>
+            <a:off x="0" y="352425"/>
+            <a:ext cx="12192000" cy="6153150"/>
           </a:xfrm>
           <a:prstGeom prst="rect">
             <a:avLst/>
           </a:prstGeom>
         </p:spPr>
       </p:pic>
+      <p:graphicFrame>
+        <p:nvGraphicFramePr>
+          <p:cNvPr id="5" name="Diagram 4">
+            <a:extLst>
+              <a:ext uri="{FF2B5EF4-FFF2-40B4-BE49-F238E27FC236}">
+                <a16:creationId xmlns:a16="http://schemas.microsoft.com/office/drawing/2014/main" id="{74296290-FFD5-4FD6-A8A5-CC725076EB93}"/>
+              </a:ext>
+            </a:extLst>
+          </p:cNvPr>
+          <p:cNvGraphicFramePr/>
+          <p:nvPr>
+            <p:extLst>
+              <p:ext uri="{D42A27DB-BD31-4B8C-83A1-F6EECF244321}">
+                <p14:modId xmlns:p14="http://schemas.microsoft.com/office/powerpoint/2010/main" val="848128613"/>
+              </p:ext>
+            </p:extLst>
+          </p:nvPr>
+        </p:nvGraphicFramePr>
+        <p:xfrm>
+          <a:off x="-300138" y="1140902"/>
+          <a:ext cx="5232866" cy="3984771"/>
+        </p:xfrm>
+        <a:graphic>
+          <a:graphicData uri="http://schemas.openxmlformats.org/drawingml/2006/diagram">
+            <dgm:relIds xmlns:dgm="http://schemas.openxmlformats.org/drawingml/2006/diagram" xmlns:r="http://schemas.openxmlformats.org/officeDocument/2006/relationships" r:dm="rId3" r:lo="rId4" r:qs="rId5" r:cs="rId6"/>
+          </a:graphicData>
+        </a:graphic>
+      </p:graphicFrame>
+      <p:sp>
+        <p:nvSpPr>
+          <p:cNvPr id="2" name="TextBox 1">
+            <a:extLst>
+              <a:ext uri="{FF2B5EF4-FFF2-40B4-BE49-F238E27FC236}">
+                <a16:creationId xmlns:a16="http://schemas.microsoft.com/office/drawing/2014/main" id="{1E4F810A-0C96-47EE-9EC3-BB6223FB0412}"/>
+              </a:ext>
+            </a:extLst>
+          </p:cNvPr>
+          <p:cNvSpPr txBox="1"/>
+          <p:nvPr/>
+        </p:nvSpPr>
+        <p:spPr>
+          <a:xfrm>
+            <a:off x="8355435" y="2650921"/>
+            <a:ext cx="1737976" cy="769441"/>
+          </a:xfrm>
+          <a:prstGeom prst="rect">
+            <a:avLst/>
+          </a:prstGeom>
+          <a:noFill/>
+        </p:spPr>
+        <p:txBody>
+          <a:bodyPr wrap="none" rtlCol="0">
+            <a:spAutoFit/>
+          </a:bodyPr>
+          <a:lstStyle/>
+          <a:p>
+            <a:r>
+              <a:rPr lang="en-US" sz="4400" dirty="0">
+                <a:solidFill>
+                  <a:schemeClr val="bg1"/>
+                </a:solidFill>
+                <a:latin typeface="Blackadder ITC" panose="04020505051007020D02" pitchFamily="82" charset="0"/>
+              </a:rPr>
+              <a:t>Thanks!</a:t>
+            </a:r>
+          </a:p>
+        </p:txBody>
+      </p:sp>
     </p:spTree>
     <p:extLst>
       <p:ext uri="{BB962C8B-B14F-4D97-AF65-F5344CB8AC3E}">
-        <p14:creationId xmlns:p14="http://schemas.microsoft.com/office/powerpoint/2010/main" val="2587523644"/>
+        <p14:creationId xmlns:p14="http://schemas.microsoft.com/office/powerpoint/2010/main" val="2732701584"/>
       </p:ext>
     </p:extLst>
   </p:cSld>

</xml_diff>